<commit_message>
clean up HighScoreException class
</commit_message>
<xml_diff>
--- a/documents/Präsentation-G2.pptx
+++ b/documents/Präsentation-G2.pptx
@@ -16,8 +16,8 @@
     <p:sldId id="273" r:id="rId4"/>
     <p:sldId id="274" r:id="rId5"/>
     <p:sldId id="275" r:id="rId6"/>
-    <p:sldId id="290" r:id="rId7"/>
-    <p:sldId id="294" r:id="rId8"/>
+    <p:sldId id="298" r:id="rId7"/>
+    <p:sldId id="299" r:id="rId8"/>
     <p:sldId id="276" r:id="rId9"/>
     <p:sldId id="277" r:id="rId10"/>
     <p:sldId id="288" r:id="rId11"/>
@@ -27,8 +27,8 @@
     <p:sldId id="278" r:id="rId15"/>
     <p:sldId id="279" r:id="rId16"/>
     <p:sldId id="295" r:id="rId17"/>
-    <p:sldId id="296" r:id="rId18"/>
-    <p:sldId id="287" r:id="rId19"/>
+    <p:sldId id="287" r:id="rId18"/>
+    <p:sldId id="297" r:id="rId19"/>
   </p:sldIdLst>
   <p:sldSz cx="12188825" cy="6858000"/>
   <p:notesSz cx="6858000" cy="9144000"/>
@@ -1471,7 +1471,7 @@
     </p:spTree>
     <p:extLst>
       <p:ext uri="{BB962C8B-B14F-4D97-AF65-F5344CB8AC3E}">
-        <p14:creationId xmlns:p14="http://schemas.microsoft.com/office/powerpoint/2010/main" val="4248574505"/>
+        <p14:creationId xmlns:p14="http://schemas.microsoft.com/office/powerpoint/2010/main" val="1668443669"/>
       </p:ext>
     </p:extLst>
   </p:cSld>
@@ -1557,7 +1557,7 @@
     </p:spTree>
     <p:extLst>
       <p:ext uri="{BB962C8B-B14F-4D97-AF65-F5344CB8AC3E}">
-        <p14:creationId xmlns:p14="http://schemas.microsoft.com/office/powerpoint/2010/main" val="1668443669"/>
+        <p14:creationId xmlns:p14="http://schemas.microsoft.com/office/powerpoint/2010/main" val="1606208927"/>
       </p:ext>
     </p:extLst>
   </p:cSld>
@@ -1987,7 +1987,7 @@
     </p:spTree>
     <p:extLst>
       <p:ext uri="{BB962C8B-B14F-4D97-AF65-F5344CB8AC3E}">
-        <p14:creationId xmlns:p14="http://schemas.microsoft.com/office/powerpoint/2010/main" val="126391304"/>
+        <p14:creationId xmlns:p14="http://schemas.microsoft.com/office/powerpoint/2010/main" val="2224896208"/>
       </p:ext>
     </p:extLst>
   </p:cSld>
@@ -2073,7 +2073,7 @@
     </p:spTree>
     <p:extLst>
       <p:ext uri="{BB962C8B-B14F-4D97-AF65-F5344CB8AC3E}">
-        <p14:creationId xmlns:p14="http://schemas.microsoft.com/office/powerpoint/2010/main" val="188394042"/>
+        <p14:creationId xmlns:p14="http://schemas.microsoft.com/office/powerpoint/2010/main" val="3190819787"/>
       </p:ext>
     </p:extLst>
   </p:cSld>
@@ -2272,55 +2272,6 @@
           <a:chExt cx="0" cy="0"/>
         </a:xfrm>
       </p:grpSpPr>
-      <p:sp>
-        <p:nvSpPr>
-          <p:cNvPr id="12" name="Rechteck 11"/>
-          <p:cNvSpPr/>
-          <p:nvPr/>
-        </p:nvSpPr>
-        <p:spPr bwMode="ltGray">
-          <a:xfrm>
-            <a:off x="0" y="5638800"/>
-            <a:ext cx="12188825" cy="1219200"/>
-          </a:xfrm>
-          <a:prstGeom prst="rect">
-            <a:avLst/>
-          </a:prstGeom>
-          <a:solidFill>
-            <a:schemeClr val="accent1">
-              <a:lumMod val="75000"/>
-              <a:alpha val="50196"/>
-            </a:schemeClr>
-          </a:solidFill>
-          <a:ln>
-            <a:noFill/>
-          </a:ln>
-        </p:spPr>
-        <p:style>
-          <a:lnRef idx="2">
-            <a:schemeClr val="accent1">
-              <a:shade val="50000"/>
-            </a:schemeClr>
-          </a:lnRef>
-          <a:fillRef idx="1">
-            <a:schemeClr val="accent1"/>
-          </a:fillRef>
-          <a:effectRef idx="0">
-            <a:schemeClr val="accent1"/>
-          </a:effectRef>
-          <a:fontRef idx="minor">
-            <a:schemeClr val="lt1"/>
-          </a:fontRef>
-        </p:style>
-        <p:txBody>
-          <a:bodyPr lIns="121899" tIns="60949" rIns="121899" bIns="60949" rtlCol="0" anchor="ctr"/>
-          <a:lstStyle/>
-          <a:p>
-            <a:pPr algn="ctr" rtl="0"/>
-            <a:endParaRPr lang="de-DE"/>
-          </a:p>
-        </p:txBody>
-      </p:sp>
       <p:sp>
         <p:nvSpPr>
           <p:cNvPr id="8" name="Rechteck 7"/>
@@ -2772,67 +2723,6 @@
       </p:sp>
       <p:sp>
         <p:nvSpPr>
-          <p:cNvPr id="4" name="Datumsplatzhalter 3"/>
-          <p:cNvSpPr>
-            <a:spLocks noGrp="1"/>
-          </p:cNvSpPr>
-          <p:nvPr>
-            <p:ph type="dt" sz="half" idx="10"/>
-          </p:nvPr>
-        </p:nvSpPr>
-        <p:spPr/>
-        <p:txBody>
-          <a:bodyPr rtlCol="0"/>
-          <a:lstStyle>
-            <a:lvl1pPr>
-              <a:defRPr baseline="0">
-                <a:solidFill>
-                  <a:schemeClr val="tx2"/>
-                </a:solidFill>
-              </a:defRPr>
-            </a:lvl1pPr>
-          </a:lstStyle>
-          <a:p>
-            <a:pPr rtl="0"/>
-            <a:r>
-              <a:rPr lang="de-DE"/>
-              <a:t>17.12.2022</a:t>
-            </a:r>
-          </a:p>
-        </p:txBody>
-      </p:sp>
-      <p:sp>
-        <p:nvSpPr>
-          <p:cNvPr id="5" name="Fußzeilenplatzhalter 4"/>
-          <p:cNvSpPr>
-            <a:spLocks noGrp="1"/>
-          </p:cNvSpPr>
-          <p:nvPr>
-            <p:ph type="ftr" sz="quarter" idx="11"/>
-          </p:nvPr>
-        </p:nvSpPr>
-        <p:spPr/>
-        <p:txBody>
-          <a:bodyPr rtlCol="0"/>
-          <a:lstStyle>
-            <a:lvl1pPr>
-              <a:defRPr b="1" baseline="0">
-                <a:solidFill>
-                  <a:schemeClr val="tx2"/>
-                </a:solidFill>
-              </a:defRPr>
-            </a:lvl1pPr>
-          </a:lstStyle>
-          <a:p>
-            <a:r>
-              <a:rPr lang="de-DE"/>
-              <a:t>Präsentation</a:t>
-            </a:r>
-          </a:p>
-        </p:txBody>
-      </p:sp>
-      <p:sp>
-        <p:nvSpPr>
           <p:cNvPr id="6" name="Foliennummernplatzhalter 5"/>
           <p:cNvSpPr>
             <a:spLocks noGrp="1"/>
@@ -2865,7 +2755,7 @@
               <a:pPr rtl="0"/>
               <a:t>‹Nr.›</a:t>
             </a:fld>
-            <a:endParaRPr lang="de-DE"/>
+            <a:endParaRPr lang="de-DE" dirty="0"/>
           </a:p>
         </p:txBody>
       </p:sp>
@@ -2897,7 +2787,7 @@
           <a:graphicData uri="http://schemas.openxmlformats.org/presentationml/2006/ole">
             <mc:AlternateContent xmlns:mc="http://schemas.openxmlformats.org/markup-compatibility/2006">
               <mc:Choice xmlns:v="urn:schemas-microsoft-com:vml" Requires="v">
-                <p:oleObj spid="_x0000_s3083" r:id="rId3" imgW="3720600" imgH="1383840" progId="">
+                <p:oleObj spid="_x0000_s3088" r:id="rId3" imgW="3720600" imgH="1383840" progId="">
                   <p:embed/>
                 </p:oleObj>
               </mc:Choice>
@@ -2938,6 +2828,117 @@
           </a:graphicData>
         </a:graphic>
       </p:graphicFrame>
+      <p:sp>
+        <p:nvSpPr>
+          <p:cNvPr id="4" name="Datumsplatzhalter 3"/>
+          <p:cNvSpPr>
+            <a:spLocks noGrp="1"/>
+          </p:cNvSpPr>
+          <p:nvPr>
+            <p:ph type="dt" sz="half" idx="10"/>
+          </p:nvPr>
+        </p:nvSpPr>
+        <p:spPr/>
+        <p:txBody>
+          <a:bodyPr rtlCol="0"/>
+          <a:lstStyle>
+            <a:lvl1pPr>
+              <a:defRPr baseline="0">
+                <a:solidFill>
+                  <a:schemeClr val="tx2"/>
+                </a:solidFill>
+              </a:defRPr>
+            </a:lvl1pPr>
+          </a:lstStyle>
+          <a:p>
+            <a:pPr rtl="0"/>
+            <a:r>
+              <a:rPr lang="de-DE"/>
+              <a:t>19.12.2022</a:t>
+            </a:r>
+            <a:endParaRPr lang="de-DE" dirty="0"/>
+          </a:p>
+        </p:txBody>
+      </p:sp>
+      <p:sp>
+        <p:nvSpPr>
+          <p:cNvPr id="5" name="Fußzeilenplatzhalter 4"/>
+          <p:cNvSpPr>
+            <a:spLocks noGrp="1"/>
+          </p:cNvSpPr>
+          <p:nvPr>
+            <p:ph type="ftr" sz="quarter" idx="11"/>
+          </p:nvPr>
+        </p:nvSpPr>
+        <p:spPr/>
+        <p:txBody>
+          <a:bodyPr rtlCol="0"/>
+          <a:lstStyle>
+            <a:lvl1pPr>
+              <a:defRPr b="1" baseline="0">
+                <a:solidFill>
+                  <a:schemeClr val="tx2"/>
+                </a:solidFill>
+              </a:defRPr>
+            </a:lvl1pPr>
+          </a:lstStyle>
+          <a:p>
+            <a:r>
+              <a:rPr lang="de-DE" dirty="0"/>
+              <a:t>Präsentation</a:t>
+            </a:r>
+          </a:p>
+        </p:txBody>
+      </p:sp>
+      <p:sp>
+        <p:nvSpPr>
+          <p:cNvPr id="12" name="Rechteck 11"/>
+          <p:cNvSpPr/>
+          <p:nvPr/>
+        </p:nvSpPr>
+        <p:spPr bwMode="ltGray">
+          <a:xfrm>
+            <a:off x="0" y="5638800"/>
+            <a:ext cx="12188825" cy="1219200"/>
+          </a:xfrm>
+          <a:prstGeom prst="rect">
+            <a:avLst/>
+          </a:prstGeom>
+          <a:solidFill>
+            <a:schemeClr val="accent1">
+              <a:lumMod val="75000"/>
+              <a:alpha val="50196"/>
+            </a:schemeClr>
+          </a:solidFill>
+          <a:ln>
+            <a:noFill/>
+          </a:ln>
+        </p:spPr>
+        <p:style>
+          <a:lnRef idx="2">
+            <a:schemeClr val="accent1">
+              <a:shade val="50000"/>
+            </a:schemeClr>
+          </a:lnRef>
+          <a:fillRef idx="1">
+            <a:schemeClr val="accent1"/>
+          </a:fillRef>
+          <a:effectRef idx="0">
+            <a:schemeClr val="accent1"/>
+          </a:effectRef>
+          <a:fontRef idx="minor">
+            <a:schemeClr val="lt1"/>
+          </a:fontRef>
+        </p:style>
+        <p:txBody>
+          <a:bodyPr lIns="121899" tIns="60949" rIns="121899" bIns="60949" rtlCol="0" anchor="ctr"/>
+          <a:lstStyle/>
+          <a:p>
+            <a:pPr algn="ctr" rtl="0"/>
+            <a:endParaRPr lang="de-DE" dirty="0"/>
+          </a:p>
+        </p:txBody>
+      </p:sp>
     </p:spTree>
     <p:extLst>
       <p:ext uri="{BB962C8B-B14F-4D97-AF65-F5344CB8AC3E}">
@@ -3219,8 +3220,8 @@
           </a:lstStyle>
           <a:p>
             <a:r>
-              <a:rPr lang="de-DE"/>
-              <a:t>17.12.2022</a:t>
+              <a:rPr lang="de-DE" dirty="0"/>
+              <a:t>19.12.2022</a:t>
             </a:r>
           </a:p>
         </p:txBody>
@@ -3786,11 +3787,11 @@
           <a:lstStyle/>
           <a:p>
             <a:pPr rtl="0"/>
-            <a:fld id="{CB3B8368-28A1-41F1-B4AA-0F7CC97B3767}" type="datetime1">
-              <a:rPr lang="de-DE" smtClean="0"/>
-              <a:t>18.12.2022</a:t>
-            </a:fld>
-            <a:endParaRPr lang="de-DE"/>
+            <a:r>
+              <a:rPr lang="de-DE"/>
+              <a:t>19.12.2022</a:t>
+            </a:r>
+            <a:endParaRPr lang="de-DE" dirty="0"/>
           </a:p>
         </p:txBody>
       </p:sp>
@@ -3812,7 +3813,7 @@
             <a:pPr rtl="0"/>
             <a:r>
               <a:rPr lang="de-DE"/>
-              <a:t>Fußzeile hinzufügen</a:t>
+              <a:t>Präsentation</a:t>
             </a:r>
           </a:p>
         </p:txBody>
@@ -4240,11 +4241,10 @@
           </a:lstStyle>
           <a:p>
             <a:pPr rtl="0"/>
-            <a:fld id="{EBD672BB-7B69-462D-9852-95B95C57FEBD}" type="datetime1">
-              <a:rPr lang="de-DE" smtClean="0"/>
-              <a:t>18.12.2022</a:t>
-            </a:fld>
-            <a:endParaRPr lang="de-DE"/>
+            <a:r>
+              <a:rPr lang="de-DE"/>
+              <a:t>19.12.2022</a:t>
+            </a:r>
           </a:p>
         </p:txBody>
       </p:sp>
@@ -4274,7 +4274,7 @@
             <a:pPr rtl="0"/>
             <a:r>
               <a:rPr lang="de-DE"/>
-              <a:t>Fußzeile hinzufügen</a:t>
+              <a:t>Präsentation</a:t>
             </a:r>
           </a:p>
         </p:txBody>
@@ -4724,8 +4724,9 @@
           <a:p>
             <a:r>
               <a:rPr lang="de-DE"/>
-              <a:t>17.12.2022</a:t>
-            </a:r>
+              <a:t>19.12.2022</a:t>
+            </a:r>
+            <a:endParaRPr lang="de-DE" dirty="0"/>
           </a:p>
         </p:txBody>
       </p:sp>
@@ -4836,7 +4837,7 @@
           <a:graphicData uri="http://schemas.openxmlformats.org/presentationml/2006/ole">
             <mc:AlternateContent xmlns:mc="http://schemas.openxmlformats.org/markup-compatibility/2006">
               <mc:Choice xmlns:v="urn:schemas-microsoft-com:vml" Requires="v">
-                <p:oleObj spid="_x0000_s2059" r:id="rId7" imgW="3720600" imgH="1383840" progId="">
+                <p:oleObj spid="_x0000_s2064" r:id="rId7" imgW="3720600" imgH="1383840" progId="">
                   <p:embed/>
                 </p:oleObj>
               </mc:Choice>
@@ -5186,7 +5187,7 @@
       </a:lvl9pPr>
     </p:otherStyle>
   </p:txStyles>
-  <p:extLst>
+  <p:extLst mod="1">
     <p:ext uri="{27BBF7A9-308A-43DC-89C8-2F10F3537804}">
       <p15:sldGuideLst xmlns:p15="http://schemas.microsoft.com/office/powerpoint/2012/main">
         <p15:guide id="1" orient="horz" pos="2160" userDrawn="1">
@@ -5244,7 +5245,7 @@
                   <a:srgbClr val="982348"/>
                 </a:solidFill>
               </a:rPr>
-              <a:t>Don‘t</a:t>
+              <a:t>Don't</a:t>
             </a:r>
             <a:r>
               <a:rPr lang="de-DE" dirty="0">
@@ -5301,8 +5302,8 @@
         </p:nvSpPr>
         <p:spPr>
           <a:xfrm>
-            <a:off x="2428668" y="4344915"/>
-            <a:ext cx="8329031" cy="1116085"/>
+            <a:off x="2428668" y="4473388"/>
+            <a:ext cx="8329031" cy="987612"/>
           </a:xfrm>
         </p:spPr>
         <p:txBody>
@@ -5318,7 +5319,7 @@
                   <a:srgbClr val="EBBECD"/>
                 </a:solidFill>
               </a:rPr>
-              <a:t>Java game für D2 – Objektorientierte Programmierung</a:t>
+              <a:t>Java Game für D2 – Objektorientierte Programmierung</a:t>
             </a:r>
           </a:p>
         </p:txBody>
@@ -5351,7 +5352,7 @@
           <a:graphicData uri="http://schemas.openxmlformats.org/presentationml/2006/ole">
             <mc:AlternateContent xmlns:mc="http://schemas.openxmlformats.org/markup-compatibility/2006">
               <mc:Choice xmlns:v="urn:schemas-microsoft-com:vml" Requires="v">
-                <p:oleObj spid="_x0000_s4107" r:id="rId4" imgW="3720600" imgH="1383840" progId="">
+                <p:oleObj spid="_x0000_s4112" r:id="rId4" imgW="3720600" imgH="1383840" progId="">
                   <p:embed/>
                 </p:oleObj>
               </mc:Choice>
@@ -5541,13 +5542,8 @@
             </a:r>
             <a:r>
               <a:rPr lang="de-DE" dirty="0"/>
-              <a:t> für </a:t>
-            </a:r>
-            <a:r>
-              <a:rPr lang="de-DE" dirty="0" err="1"/>
-              <a:t>Coutdown</a:t>
-            </a:r>
-            <a:endParaRPr lang="de-DE" dirty="0"/>
+              <a:t> für Countdown</a:t>
+            </a:r>
           </a:p>
           <a:p>
             <a:r>
@@ -5597,7 +5593,7 @@
           <a:graphicData uri="http://schemas.openxmlformats.org/presentationml/2006/ole">
             <mc:AlternateContent xmlns:mc="http://schemas.openxmlformats.org/markup-compatibility/2006">
               <mc:Choice xmlns:v="urn:schemas-microsoft-com:vml" Requires="v">
-                <p:oleObj spid="_x0000_s10251" r:id="rId4" imgW="3720600" imgH="1383840" progId="">
+                <p:oleObj spid="_x0000_s10257" r:id="rId4" imgW="3720600" imgH="1383840" progId="">
                   <p:embed/>
                 </p:oleObj>
               </mc:Choice>
@@ -5638,41 +5634,6 @@
           </a:graphicData>
         </a:graphic>
       </p:graphicFrame>
-      <p:sp>
-        <p:nvSpPr>
-          <p:cNvPr id="5" name="Foliennummernplatzhalter 5">
-            <a:extLst>
-              <a:ext uri="{FF2B5EF4-FFF2-40B4-BE49-F238E27FC236}">
-                <a16:creationId xmlns:a16="http://schemas.microsoft.com/office/drawing/2014/main" id="{3D79B3E5-D500-4756-BF6D-C0C74895E838}"/>
-              </a:ext>
-            </a:extLst>
-          </p:cNvPr>
-          <p:cNvSpPr>
-            <a:spLocks noGrp="1"/>
-          </p:cNvSpPr>
-          <p:nvPr>
-            <p:ph type="sldNum" sz="quarter" idx="12"/>
-          </p:nvPr>
-        </p:nvSpPr>
-        <p:spPr>
-          <a:xfrm>
-            <a:off x="10766796" y="6356351"/>
-            <a:ext cx="609441" cy="365125"/>
-          </a:xfrm>
-        </p:spPr>
-        <p:txBody>
-          <a:bodyPr rtlCol="0"/>
-          <a:lstStyle/>
-          <a:p>
-            <a:pPr rtl="0"/>
-            <a:fld id="{7DC1BBB0-96F0-4077-A278-0F3FB5C104D3}" type="slidenum">
-              <a:rPr lang="de-DE"/>
-              <a:t>10</a:t>
-            </a:fld>
-            <a:endParaRPr lang="de-DE"/>
-          </a:p>
-        </p:txBody>
-      </p:sp>
       <p:pic>
         <p:nvPicPr>
           <p:cNvPr id="3" name="Grafik 2">
@@ -5821,14 +5782,18 @@
           <a:p>
             <a:r>
               <a:rPr lang="de-DE" dirty="0"/>
-              <a:t>Abstrakte Klasse mit Fähigkeit</a:t>
+              <a:t>Abstrakte Klasse mit Fähig-</a:t>
             </a:r>
             <a:br>
               <a:rPr lang="de-DE" dirty="0"/>
             </a:br>
             <a:r>
+              <a:rPr lang="de-DE" dirty="0" err="1"/>
+              <a:t>keit</a:t>
+            </a:r>
+            <a:r>
               <a:rPr lang="de-DE" dirty="0"/>
-              <a:t>ein </a:t>
+              <a:t> ein </a:t>
             </a:r>
             <a:r>
               <a:rPr lang="de-DE" dirty="0" err="1"/>
@@ -5917,7 +5882,7 @@
           <a:graphicData uri="http://schemas.openxmlformats.org/presentationml/2006/ole">
             <mc:AlternateContent xmlns:mc="http://schemas.openxmlformats.org/markup-compatibility/2006">
               <mc:Choice xmlns:v="urn:schemas-microsoft-com:vml" Requires="v">
-                <p:oleObj spid="_x0000_s1036" r:id="rId4" imgW="3720600" imgH="1383840" progId="">
+                <p:oleObj spid="_x0000_s1042" r:id="rId4" imgW="3720600" imgH="1383840" progId="">
                   <p:embed/>
                 </p:oleObj>
               </mc:Choice>
@@ -5958,41 +5923,6 @@
           </a:graphicData>
         </a:graphic>
       </p:graphicFrame>
-      <p:sp>
-        <p:nvSpPr>
-          <p:cNvPr id="5" name="Foliennummernplatzhalter 5">
-            <a:extLst>
-              <a:ext uri="{FF2B5EF4-FFF2-40B4-BE49-F238E27FC236}">
-                <a16:creationId xmlns:a16="http://schemas.microsoft.com/office/drawing/2014/main" id="{3D79B3E5-D500-4756-BF6D-C0C74895E838}"/>
-              </a:ext>
-            </a:extLst>
-          </p:cNvPr>
-          <p:cNvSpPr>
-            <a:spLocks noGrp="1"/>
-          </p:cNvSpPr>
-          <p:nvPr>
-            <p:ph type="sldNum" sz="quarter" idx="12"/>
-          </p:nvPr>
-        </p:nvSpPr>
-        <p:spPr>
-          <a:xfrm>
-            <a:off x="10766796" y="6356351"/>
-            <a:ext cx="609441" cy="365125"/>
-          </a:xfrm>
-        </p:spPr>
-        <p:txBody>
-          <a:bodyPr rtlCol="0"/>
-          <a:lstStyle/>
-          <a:p>
-            <a:pPr rtl="0"/>
-            <a:fld id="{7DC1BBB0-96F0-4077-A278-0F3FB5C104D3}" type="slidenum">
-              <a:rPr lang="de-DE"/>
-              <a:t>11</a:t>
-            </a:fld>
-            <a:endParaRPr lang="de-DE"/>
-          </a:p>
-        </p:txBody>
-      </p:sp>
       <p:pic>
         <p:nvPicPr>
           <p:cNvPr id="3" name="Grafik 2">
@@ -6095,13 +6025,13 @@
   <p:clrMapOvr>
     <a:masterClrMapping/>
   </p:clrMapOvr>
-  <mc:AlternateContent xmlns:mc="http://schemas.openxmlformats.org/markup-compatibility/2006">
-    <mc:Choice xmlns:p14="http://schemas.microsoft.com/office/powerpoint/2010/main" Requires="p14">
+  <mc:AlternateContent xmlns:mc="http://schemas.openxmlformats.org/markup-compatibility/2006" xmlns:p14="http://schemas.microsoft.com/office/powerpoint/2010/main">
+    <mc:Choice Requires="p14">
       <p:transition spd="med" p14:dur="700">
         <p:fade/>
       </p:transition>
     </mc:Choice>
-    <mc:Fallback>
+    <mc:Fallback xmlns="">
       <p:transition spd="med">
         <p:fade/>
       </p:transition>
@@ -6193,7 +6123,7 @@
             </a:r>
             <a:r>
               <a:rPr lang="de-DE" dirty="0"/>
-              <a:t> Objekte</a:t>
+              <a:t>-Objekte</a:t>
             </a:r>
             <a:br>
               <a:rPr lang="de-DE" dirty="0"/>
@@ -6243,7 +6173,7 @@
             <a:pPr lvl="1"/>
             <a:r>
               <a:rPr lang="de-DE" dirty="0"/>
-              <a:t>User Name</a:t>
+              <a:t>User*in Name</a:t>
             </a:r>
           </a:p>
           <a:p>
@@ -6296,7 +6226,7 @@
           <a:graphicData uri="http://schemas.openxmlformats.org/presentationml/2006/ole">
             <mc:AlternateContent xmlns:mc="http://schemas.openxmlformats.org/markup-compatibility/2006">
               <mc:Choice xmlns:v="urn:schemas-microsoft-com:vml" Requires="v">
-                <p:oleObj spid="_x0000_s23563" r:id="rId4" imgW="3720600" imgH="1383840" progId="">
+                <p:oleObj spid="_x0000_s23569" r:id="rId4" imgW="3720600" imgH="1383840" progId="">
                   <p:embed/>
                 </p:oleObj>
               </mc:Choice>
@@ -6337,41 +6267,6 @@
           </a:graphicData>
         </a:graphic>
       </p:graphicFrame>
-      <p:sp>
-        <p:nvSpPr>
-          <p:cNvPr id="5" name="Foliennummernplatzhalter 5">
-            <a:extLst>
-              <a:ext uri="{FF2B5EF4-FFF2-40B4-BE49-F238E27FC236}">
-                <a16:creationId xmlns:a16="http://schemas.microsoft.com/office/drawing/2014/main" id="{3D79B3E5-D500-4756-BF6D-C0C74895E838}"/>
-              </a:ext>
-            </a:extLst>
-          </p:cNvPr>
-          <p:cNvSpPr>
-            <a:spLocks noGrp="1"/>
-          </p:cNvSpPr>
-          <p:nvPr>
-            <p:ph type="sldNum" sz="quarter" idx="12"/>
-          </p:nvPr>
-        </p:nvSpPr>
-        <p:spPr>
-          <a:xfrm>
-            <a:off x="10766796" y="6356351"/>
-            <a:ext cx="609441" cy="365125"/>
-          </a:xfrm>
-        </p:spPr>
-        <p:txBody>
-          <a:bodyPr rtlCol="0"/>
-          <a:lstStyle/>
-          <a:p>
-            <a:pPr rtl="0"/>
-            <a:fld id="{7DC1BBB0-96F0-4077-A278-0F3FB5C104D3}" type="slidenum">
-              <a:rPr lang="de-DE"/>
-              <a:t>12</a:t>
-            </a:fld>
-            <a:endParaRPr lang="de-DE"/>
-          </a:p>
-        </p:txBody>
-      </p:sp>
       <p:pic>
         <p:nvPicPr>
           <p:cNvPr id="3" name="Grafik 2">
@@ -6422,13 +6317,13 @@
   <p:clrMapOvr>
     <a:masterClrMapping/>
   </p:clrMapOvr>
-  <mc:AlternateContent xmlns:mc="http://schemas.openxmlformats.org/markup-compatibility/2006">
-    <mc:Choice xmlns:p14="http://schemas.microsoft.com/office/powerpoint/2010/main" Requires="p14">
+  <mc:AlternateContent xmlns:mc="http://schemas.openxmlformats.org/markup-compatibility/2006" xmlns:p14="http://schemas.microsoft.com/office/powerpoint/2010/main">
+    <mc:Choice Requires="p14">
       <p:transition spd="med" p14:dur="700">
         <p:fade/>
       </p:transition>
     </mc:Choice>
-    <mc:Fallback>
+    <mc:Fallback xmlns="">
       <p:transition spd="med">
         <p:fade/>
       </p:transition>
@@ -6565,7 +6460,7 @@
           <a:graphicData uri="http://schemas.openxmlformats.org/presentationml/2006/ole">
             <mc:AlternateContent xmlns:mc="http://schemas.openxmlformats.org/markup-compatibility/2006">
               <mc:Choice xmlns:v="urn:schemas-microsoft-com:vml" Requires="v">
-                <p:oleObj spid="_x0000_s24586" r:id="rId4" imgW="3720600" imgH="1383840" progId="">
+                <p:oleObj spid="_x0000_s24591" r:id="rId4" imgW="3720600" imgH="1383840" progId="">
                   <p:embed/>
                 </p:oleObj>
               </mc:Choice>
@@ -6606,41 +6501,6 @@
           </a:graphicData>
         </a:graphic>
       </p:graphicFrame>
-      <p:sp>
-        <p:nvSpPr>
-          <p:cNvPr id="5" name="Foliennummernplatzhalter 5">
-            <a:extLst>
-              <a:ext uri="{FF2B5EF4-FFF2-40B4-BE49-F238E27FC236}">
-                <a16:creationId xmlns:a16="http://schemas.microsoft.com/office/drawing/2014/main" id="{3D79B3E5-D500-4756-BF6D-C0C74895E838}"/>
-              </a:ext>
-            </a:extLst>
-          </p:cNvPr>
-          <p:cNvSpPr>
-            <a:spLocks noGrp="1"/>
-          </p:cNvSpPr>
-          <p:nvPr>
-            <p:ph type="sldNum" sz="quarter" idx="12"/>
-          </p:nvPr>
-        </p:nvSpPr>
-        <p:spPr>
-          <a:xfrm>
-            <a:off x="10766796" y="6356351"/>
-            <a:ext cx="609441" cy="365125"/>
-          </a:xfrm>
-        </p:spPr>
-        <p:txBody>
-          <a:bodyPr rtlCol="0"/>
-          <a:lstStyle/>
-          <a:p>
-            <a:pPr rtl="0"/>
-            <a:fld id="{7DC1BBB0-96F0-4077-A278-0F3FB5C104D3}" type="slidenum">
-              <a:rPr lang="de-DE"/>
-              <a:t>13</a:t>
-            </a:fld>
-            <a:endParaRPr lang="de-DE"/>
-          </a:p>
-        </p:txBody>
-      </p:sp>
       <p:pic>
         <p:nvPicPr>
           <p:cNvPr id="3" name="Grafik 2">
@@ -6691,13 +6551,13 @@
   <p:clrMapOvr>
     <a:masterClrMapping/>
   </p:clrMapOvr>
-  <mc:AlternateContent xmlns:mc="http://schemas.openxmlformats.org/markup-compatibility/2006">
-    <mc:Choice xmlns:p14="http://schemas.microsoft.com/office/powerpoint/2010/main" Requires="p14">
+  <mc:AlternateContent xmlns:mc="http://schemas.openxmlformats.org/markup-compatibility/2006" xmlns:p14="http://schemas.microsoft.com/office/powerpoint/2010/main">
+    <mc:Choice Requires="p14">
       <p:transition spd="med" p14:dur="700">
         <p:fade/>
       </p:transition>
     </mc:Choice>
-    <mc:Fallback>
+    <mc:Fallback xmlns="">
       <p:transition spd="med">
         <p:fade/>
       </p:transition>
@@ -6790,7 +6650,7 @@
             </a:r>
             <a:r>
               <a:rPr lang="de-DE" dirty="0"/>
-              <a:t> Variable zugänglich</a:t>
+              <a:t>-Variable zugänglich</a:t>
             </a:r>
           </a:p>
           <a:p>
@@ -6829,7 +6689,7 @@
           <a:graphicData uri="http://schemas.openxmlformats.org/presentationml/2006/ole">
             <mc:AlternateContent xmlns:mc="http://schemas.openxmlformats.org/markup-compatibility/2006">
               <mc:Choice xmlns:v="urn:schemas-microsoft-com:vml" Requires="v">
-                <p:oleObj spid="_x0000_s12299" r:id="rId4" imgW="3720600" imgH="1383840" progId="">
+                <p:oleObj spid="_x0000_s12305" r:id="rId4" imgW="3720600" imgH="1383840" progId="">
                   <p:embed/>
                 </p:oleObj>
               </mc:Choice>
@@ -6870,41 +6730,6 @@
           </a:graphicData>
         </a:graphic>
       </p:graphicFrame>
-      <p:sp>
-        <p:nvSpPr>
-          <p:cNvPr id="5" name="Foliennummernplatzhalter 5">
-            <a:extLst>
-              <a:ext uri="{FF2B5EF4-FFF2-40B4-BE49-F238E27FC236}">
-                <a16:creationId xmlns:a16="http://schemas.microsoft.com/office/drawing/2014/main" id="{3D79B3E5-D500-4756-BF6D-C0C74895E838}"/>
-              </a:ext>
-            </a:extLst>
-          </p:cNvPr>
-          <p:cNvSpPr>
-            <a:spLocks noGrp="1"/>
-          </p:cNvSpPr>
-          <p:nvPr>
-            <p:ph type="sldNum" sz="quarter" idx="12"/>
-          </p:nvPr>
-        </p:nvSpPr>
-        <p:spPr>
-          <a:xfrm>
-            <a:off x="10766796" y="6356351"/>
-            <a:ext cx="609441" cy="365125"/>
-          </a:xfrm>
-        </p:spPr>
-        <p:txBody>
-          <a:bodyPr rtlCol="0"/>
-          <a:lstStyle/>
-          <a:p>
-            <a:pPr rtl="0"/>
-            <a:fld id="{7DC1BBB0-96F0-4077-A278-0F3FB5C104D3}" type="slidenum">
-              <a:rPr lang="de-DE"/>
-              <a:t>14</a:t>
-            </a:fld>
-            <a:endParaRPr lang="de-DE"/>
-          </a:p>
-        </p:txBody>
-      </p:sp>
     </p:spTree>
     <p:extLst>
       <p:ext uri="{BB962C8B-B14F-4D97-AF65-F5344CB8AC3E}">
@@ -7079,7 +6904,7 @@
             </a:pPr>
             <a:r>
               <a:rPr lang="de-DE" dirty="0"/>
-              <a:t>Ist Highscore nach dem laden immer noch gleich wie vor dem Speichern?</a:t>
+              <a:t>Ist Highscore nach dem Laden immer noch gleich wie vor dem Speichern?</a:t>
             </a:r>
           </a:p>
           <a:p>
@@ -7109,7 +6934,7 @@
           <a:graphicData uri="http://schemas.openxmlformats.org/presentationml/2006/ole">
             <mc:AlternateContent xmlns:mc="http://schemas.openxmlformats.org/markup-compatibility/2006">
               <mc:Choice xmlns:v="urn:schemas-microsoft-com:vml" Requires="v">
-                <p:oleObj spid="_x0000_s13323" r:id="rId4" imgW="3720600" imgH="1383840" progId="">
+                <p:oleObj spid="_x0000_s13329" r:id="rId4" imgW="3720600" imgH="1383840" progId="">
                   <p:embed/>
                 </p:oleObj>
               </mc:Choice>
@@ -7150,41 +6975,6 @@
           </a:graphicData>
         </a:graphic>
       </p:graphicFrame>
-      <p:sp>
-        <p:nvSpPr>
-          <p:cNvPr id="5" name="Foliennummernplatzhalter 5">
-            <a:extLst>
-              <a:ext uri="{FF2B5EF4-FFF2-40B4-BE49-F238E27FC236}">
-                <a16:creationId xmlns:a16="http://schemas.microsoft.com/office/drawing/2014/main" id="{3D79B3E5-D500-4756-BF6D-C0C74895E838}"/>
-              </a:ext>
-            </a:extLst>
-          </p:cNvPr>
-          <p:cNvSpPr>
-            <a:spLocks noGrp="1"/>
-          </p:cNvSpPr>
-          <p:nvPr>
-            <p:ph type="sldNum" sz="quarter" idx="12"/>
-          </p:nvPr>
-        </p:nvSpPr>
-        <p:spPr>
-          <a:xfrm>
-            <a:off x="10766796" y="6356351"/>
-            <a:ext cx="609441" cy="365125"/>
-          </a:xfrm>
-        </p:spPr>
-        <p:txBody>
-          <a:bodyPr rtlCol="0"/>
-          <a:lstStyle/>
-          <a:p>
-            <a:pPr rtl="0"/>
-            <a:fld id="{7DC1BBB0-96F0-4077-A278-0F3FB5C104D3}" type="slidenum">
-              <a:rPr lang="de-DE"/>
-              <a:t>15</a:t>
-            </a:fld>
-            <a:endParaRPr lang="de-DE"/>
-          </a:p>
-        </p:txBody>
-      </p:sp>
     </p:spTree>
     <p:extLst>
       <p:ext uri="{BB962C8B-B14F-4D97-AF65-F5344CB8AC3E}">
@@ -7343,7 +7133,7 @@
           <a:graphicData uri="http://schemas.openxmlformats.org/presentationml/2006/ole">
             <mc:AlternateContent xmlns:mc="http://schemas.openxmlformats.org/markup-compatibility/2006">
               <mc:Choice xmlns:v="urn:schemas-microsoft-com:vml" Requires="v">
-                <p:oleObj spid="_x0000_s27655" r:id="rId4" imgW="3720600" imgH="1383840" progId="">
+                <p:oleObj spid="_x0000_s27660" r:id="rId4" imgW="3720600" imgH="1383840" progId="">
                   <p:embed/>
                 </p:oleObj>
               </mc:Choice>
@@ -7384,41 +7174,6 @@
           </a:graphicData>
         </a:graphic>
       </p:graphicFrame>
-      <p:sp>
-        <p:nvSpPr>
-          <p:cNvPr id="5" name="Foliennummernplatzhalter 5">
-            <a:extLst>
-              <a:ext uri="{FF2B5EF4-FFF2-40B4-BE49-F238E27FC236}">
-                <a16:creationId xmlns:a16="http://schemas.microsoft.com/office/drawing/2014/main" id="{3D79B3E5-D500-4756-BF6D-C0C74895E838}"/>
-              </a:ext>
-            </a:extLst>
-          </p:cNvPr>
-          <p:cNvSpPr>
-            <a:spLocks noGrp="1"/>
-          </p:cNvSpPr>
-          <p:nvPr>
-            <p:ph type="sldNum" sz="quarter" idx="12"/>
-          </p:nvPr>
-        </p:nvSpPr>
-        <p:spPr>
-          <a:xfrm>
-            <a:off x="10766796" y="6356351"/>
-            <a:ext cx="609441" cy="365125"/>
-          </a:xfrm>
-        </p:spPr>
-        <p:txBody>
-          <a:bodyPr rtlCol="0"/>
-          <a:lstStyle/>
-          <a:p>
-            <a:pPr rtl="0"/>
-            <a:fld id="{7DC1BBB0-96F0-4077-A278-0F3FB5C104D3}" type="slidenum">
-              <a:rPr lang="de-DE"/>
-              <a:t>16</a:t>
-            </a:fld>
-            <a:endParaRPr lang="de-DE"/>
-          </a:p>
-        </p:txBody>
-      </p:sp>
     </p:spTree>
     <p:extLst>
       <p:ext uri="{BB962C8B-B14F-4D97-AF65-F5344CB8AC3E}">
@@ -7429,13 +7184,13 @@
   <p:clrMapOvr>
     <a:masterClrMapping/>
   </p:clrMapOvr>
-  <mc:AlternateContent xmlns:mc="http://schemas.openxmlformats.org/markup-compatibility/2006">
-    <mc:Choice xmlns:p14="http://schemas.microsoft.com/office/powerpoint/2010/main" Requires="p14">
+  <mc:AlternateContent xmlns:mc="http://schemas.openxmlformats.org/markup-compatibility/2006" xmlns:p14="http://schemas.microsoft.com/office/powerpoint/2010/main">
+    <mc:Choice Requires="p14">
       <p:transition spd="med" p14:dur="700">
         <p:fade/>
       </p:transition>
     </mc:Choice>
-    <mc:Fallback>
+    <mc:Fallback xmlns="">
       <p:transition spd="med">
         <p:fade/>
       </p:transition>
@@ -7461,273 +7216,6 @@
           <a:chExt cx="0" cy="0"/>
         </a:xfrm>
       </p:grpSpPr>
-      <p:sp>
-        <p:nvSpPr>
-          <p:cNvPr id="4" name="Titel 3">
-            <a:extLst>
-              <a:ext uri="{FF2B5EF4-FFF2-40B4-BE49-F238E27FC236}">
-                <a16:creationId xmlns:a16="http://schemas.microsoft.com/office/drawing/2014/main" id="{5F276C15-D03E-43D3-A21E-BC22E0ABED34}"/>
-              </a:ext>
-            </a:extLst>
-          </p:cNvPr>
-          <p:cNvSpPr>
-            <a:spLocks noGrp="1"/>
-          </p:cNvSpPr>
-          <p:nvPr>
-            <p:ph type="ctrTitle"/>
-          </p:nvPr>
-        </p:nvSpPr>
-        <p:spPr>
-          <a:xfrm>
-            <a:off x="2428669" y="1600201"/>
-            <a:ext cx="8329031" cy="1917700"/>
-          </a:xfrm>
-        </p:spPr>
-        <p:txBody>
-          <a:bodyPr/>
-          <a:lstStyle/>
-          <a:p>
-            <a:pPr algn="ctr"/>
-            <a:r>
-              <a:rPr lang="de-AT" sz="4400" dirty="0">
-                <a:solidFill>
-                  <a:srgbClr val="982348"/>
-                </a:solidFill>
-              </a:rPr>
-              <a:t>Code Review</a:t>
-            </a:r>
-          </a:p>
-        </p:txBody>
-      </p:sp>
-      <p:sp>
-        <p:nvSpPr>
-          <p:cNvPr id="5" name="Foliennummernplatzhalter 5">
-            <a:extLst>
-              <a:ext uri="{FF2B5EF4-FFF2-40B4-BE49-F238E27FC236}">
-                <a16:creationId xmlns:a16="http://schemas.microsoft.com/office/drawing/2014/main" id="{3D79B3E5-D500-4756-BF6D-C0C74895E838}"/>
-              </a:ext>
-            </a:extLst>
-          </p:cNvPr>
-          <p:cNvSpPr>
-            <a:spLocks noGrp="1"/>
-          </p:cNvSpPr>
-          <p:nvPr>
-            <p:ph type="sldNum" sz="quarter" idx="12"/>
-          </p:nvPr>
-        </p:nvSpPr>
-        <p:spPr/>
-        <p:txBody>
-          <a:bodyPr rtlCol="0"/>
-          <a:lstStyle/>
-          <a:p>
-            <a:pPr rtl="0"/>
-            <a:fld id="{7DC1BBB0-96F0-4077-A278-0F3FB5C104D3}" type="slidenum">
-              <a:rPr lang="de-DE"/>
-              <a:t>17</a:t>
-            </a:fld>
-            <a:endParaRPr lang="de-DE"/>
-          </a:p>
-        </p:txBody>
-      </p:sp>
-      <p:graphicFrame>
-        <p:nvGraphicFramePr>
-          <p:cNvPr id="7" name="Objekt 6">
-            <a:extLst>
-              <a:ext uri="{FF2B5EF4-FFF2-40B4-BE49-F238E27FC236}">
-                <a16:creationId xmlns:a16="http://schemas.microsoft.com/office/drawing/2014/main" id="{00ADAD02-CF42-4526-AFC8-3D47C39E9F67}"/>
-              </a:ext>
-            </a:extLst>
-          </p:cNvPr>
-          <p:cNvGraphicFramePr>
-            <a:graphicFrameLocks noChangeAspect="1"/>
-          </p:cNvGraphicFramePr>
-          <p:nvPr/>
-        </p:nvGraphicFramePr>
-        <p:xfrm>
-          <a:off x="9702200" y="136524"/>
-          <a:ext cx="2129191" cy="792088"/>
-        </p:xfrm>
-        <a:graphic>
-          <a:graphicData uri="http://schemas.openxmlformats.org/presentationml/2006/ole">
-            <mc:AlternateContent xmlns:mc="http://schemas.openxmlformats.org/markup-compatibility/2006">
-              <mc:Choice xmlns:v="urn:schemas-microsoft-com:vml" Requires="v">
-                <p:oleObj spid="_x0000_s28679" r:id="rId4" imgW="3720600" imgH="1383840" progId="">
-                  <p:embed/>
-                </p:oleObj>
-              </mc:Choice>
-              <mc:Fallback>
-                <p:oleObj r:id="rId4" imgW="3720600" imgH="1383840" progId="">
-                  <p:embed/>
-                  <p:pic>
-                    <p:nvPicPr>
-                      <p:cNvPr id="7" name="Objekt 6">
-                        <a:extLst>
-                          <a:ext uri="{FF2B5EF4-FFF2-40B4-BE49-F238E27FC236}">
-                            <a16:creationId xmlns:a16="http://schemas.microsoft.com/office/drawing/2014/main" id="{00ADAD02-CF42-4526-AFC8-3D47C39E9F67}"/>
-                          </a:ext>
-                        </a:extLst>
-                      </p:cNvPr>
-                      <p:cNvPicPr/>
-                      <p:nvPr/>
-                    </p:nvPicPr>
-                    <p:blipFill>
-                      <a:blip r:embed="rId5"/>
-                      <a:stretch>
-                        <a:fillRect/>
-                      </a:stretch>
-                    </p:blipFill>
-                    <p:spPr>
-                      <a:xfrm>
-                        <a:off x="9702200" y="136524"/>
-                        <a:ext cx="2129191" cy="792088"/>
-                      </a:xfrm>
-                      <a:prstGeom prst="rect">
-                        <a:avLst/>
-                      </a:prstGeom>
-                    </p:spPr>
-                  </p:pic>
-                </p:oleObj>
-              </mc:Fallback>
-            </mc:AlternateContent>
-          </a:graphicData>
-        </a:graphic>
-      </p:graphicFrame>
-      <p:sp>
-        <p:nvSpPr>
-          <p:cNvPr id="6" name="Rechteck 5">
-            <a:extLst>
-              <a:ext uri="{FF2B5EF4-FFF2-40B4-BE49-F238E27FC236}">
-                <a16:creationId xmlns:a16="http://schemas.microsoft.com/office/drawing/2014/main" id="{7E4DB7F4-0BF8-413D-8BA3-E6E5A3F2AB68}"/>
-              </a:ext>
-            </a:extLst>
-          </p:cNvPr>
-          <p:cNvSpPr/>
-          <p:nvPr/>
-        </p:nvSpPr>
-        <p:spPr bwMode="gray">
-          <a:xfrm>
-            <a:off x="625808" y="0"/>
-            <a:ext cx="644068" cy="6858000"/>
-          </a:xfrm>
-          <a:prstGeom prst="rect">
-            <a:avLst/>
-          </a:prstGeom>
-          <a:solidFill>
-            <a:srgbClr val="6A8093"/>
-          </a:solidFill>
-          <a:ln>
-            <a:noFill/>
-          </a:ln>
-        </p:spPr>
-        <p:style>
-          <a:lnRef idx="2">
-            <a:schemeClr val="accent1">
-              <a:shade val="50000"/>
-            </a:schemeClr>
-          </a:lnRef>
-          <a:fillRef idx="1">
-            <a:schemeClr val="accent1"/>
-          </a:fillRef>
-          <a:effectRef idx="0">
-            <a:schemeClr val="accent1"/>
-          </a:effectRef>
-          <a:fontRef idx="minor">
-            <a:schemeClr val="lt1"/>
-          </a:fontRef>
-        </p:style>
-        <p:txBody>
-          <a:bodyPr lIns="121899" tIns="60949" rIns="121899" bIns="60949" rtlCol="0" anchor="ctr"/>
-          <a:lstStyle/>
-          <a:p>
-            <a:pPr algn="ctr" rtl="0"/>
-            <a:endParaRPr lang="de-DE"/>
-          </a:p>
-        </p:txBody>
-      </p:sp>
-    </p:spTree>
-    <p:extLst>
-      <p:ext uri="{BB962C8B-B14F-4D97-AF65-F5344CB8AC3E}">
-        <p14:creationId xmlns:p14="http://schemas.microsoft.com/office/powerpoint/2010/main" val="1483501959"/>
-      </p:ext>
-    </p:extLst>
-  </p:cSld>
-  <p:clrMapOvr>
-    <a:masterClrMapping/>
-  </p:clrMapOvr>
-  <mc:AlternateContent xmlns:mc="http://schemas.openxmlformats.org/markup-compatibility/2006">
-    <mc:Choice xmlns:p14="http://schemas.microsoft.com/office/powerpoint/2010/main" Requires="p14">
-      <p:transition spd="med" p14:dur="700">
-        <p:fade/>
-      </p:transition>
-    </mc:Choice>
-    <mc:Fallback>
-      <p:transition spd="med">
-        <p:fade/>
-      </p:transition>
-    </mc:Fallback>
-  </mc:AlternateContent>
-</p:sld>
-</file>
-
-<file path=ppt/slides/slide18.xml><?xml version="1.0" encoding="utf-8"?>
-<p:sld xmlns:a="http://schemas.openxmlformats.org/drawingml/2006/main" xmlns:r="http://schemas.openxmlformats.org/officeDocument/2006/relationships" xmlns:p="http://schemas.openxmlformats.org/presentationml/2006/main">
-  <p:cSld>
-    <p:spTree>
-      <p:nvGrpSpPr>
-        <p:cNvPr id="1" name=""/>
-        <p:cNvGrpSpPr/>
-        <p:nvPr/>
-      </p:nvGrpSpPr>
-      <p:grpSpPr>
-        <a:xfrm>
-          <a:off x="0" y="0"/>
-          <a:ext cx="0" cy="0"/>
-          <a:chOff x="0" y="0"/>
-          <a:chExt cx="0" cy="0"/>
-        </a:xfrm>
-      </p:grpSpPr>
-      <p:sp>
-        <p:nvSpPr>
-          <p:cNvPr id="2" name="Titel 1"/>
-          <p:cNvSpPr>
-            <a:spLocks noGrp="1"/>
-          </p:cNvSpPr>
-          <p:nvPr>
-            <p:ph type="ctrTitle"/>
-          </p:nvPr>
-        </p:nvSpPr>
-        <p:spPr/>
-        <p:txBody>
-          <a:bodyPr rtlCol="0"/>
-          <a:lstStyle/>
-          <a:p>
-            <a:pPr rtl="0"/>
-            <a:r>
-              <a:rPr lang="de-DE" dirty="0">
-                <a:solidFill>
-                  <a:srgbClr val="982348"/>
-                </a:solidFill>
-              </a:rPr>
-              <a:t>Wir danken für</a:t>
-            </a:r>
-            <a:br>
-              <a:rPr lang="de-DE" dirty="0">
-                <a:solidFill>
-                  <a:srgbClr val="982348"/>
-                </a:solidFill>
-              </a:rPr>
-            </a:br>
-            <a:r>
-              <a:rPr lang="de-DE" dirty="0">
-                <a:solidFill>
-                  <a:srgbClr val="982348"/>
-                </a:solidFill>
-              </a:rPr>
-              <a:t>Ihre Aufmerksamkeit!</a:t>
-            </a:r>
-          </a:p>
-        </p:txBody>
-      </p:sp>
       <p:graphicFrame>
         <p:nvGraphicFramePr>
           <p:cNvPr id="8" name="Objekt 7">
@@ -7750,7 +7238,7 @@
           <a:graphicData uri="http://schemas.openxmlformats.org/presentationml/2006/ole">
             <mc:AlternateContent xmlns:mc="http://schemas.openxmlformats.org/markup-compatibility/2006">
               <mc:Choice xmlns:v="urn:schemas-microsoft-com:vml" Requires="v">
-                <p:oleObj spid="_x0000_s21515" r:id="rId4" imgW="3720600" imgH="1383840" progId="">
+                <p:oleObj spid="_x0000_s21521" r:id="rId4" imgW="3720600" imgH="1383840" progId="">
                   <p:embed/>
                 </p:oleObj>
               </mc:Choice>
@@ -7793,26 +7281,348 @@
       </p:graphicFrame>
       <p:sp>
         <p:nvSpPr>
-          <p:cNvPr id="5" name="Untertitel 4">
+          <p:cNvPr id="7" name="Titel 3">
             <a:extLst>
               <a:ext uri="{FF2B5EF4-FFF2-40B4-BE49-F238E27FC236}">
-                <a16:creationId xmlns:a16="http://schemas.microsoft.com/office/drawing/2014/main" id="{D4743117-88AA-4312-A702-917FAAD602AE}"/>
+                <a16:creationId xmlns:a16="http://schemas.microsoft.com/office/drawing/2014/main" id="{9A582ADB-795A-4596-B8C7-916FB2195E61}"/>
               </a:ext>
             </a:extLst>
           </p:cNvPr>
+          <p:cNvSpPr txBox="1">
+            <a:spLocks/>
+          </p:cNvSpPr>
+          <p:nvPr/>
+        </p:nvSpPr>
+        <p:spPr>
+          <a:xfrm>
+            <a:off x="2581069" y="1752600"/>
+            <a:ext cx="8329031" cy="2680127"/>
+          </a:xfrm>
+          <a:prstGeom prst="rect">
+            <a:avLst/>
+          </a:prstGeom>
+        </p:spPr>
+        <p:txBody>
+          <a:bodyPr vert="horz" lIns="91440" tIns="45720" rIns="91440" bIns="45720" rtlCol="0" anchor="b">
+            <a:noAutofit/>
+          </a:bodyPr>
+          <a:lstStyle>
+            <a:lvl1pPr algn="l" defTabSz="914400" rtl="0" eaLnBrk="1" latinLnBrk="0" hangingPunct="1">
+              <a:lnSpc>
+                <a:spcPct val="90000"/>
+              </a:lnSpc>
+              <a:spcBef>
+                <a:spcPct val="0"/>
+              </a:spcBef>
+              <a:buNone/>
+              <a:defRPr sz="5400" kern="1200">
+                <a:solidFill>
+                  <a:schemeClr val="tx1">
+                    <a:lumMod val="75000"/>
+                  </a:schemeClr>
+                </a:solidFill>
+                <a:latin typeface="+mj-lt"/>
+                <a:ea typeface="+mj-ea"/>
+                <a:cs typeface="+mj-cs"/>
+              </a:defRPr>
+            </a:lvl1pPr>
+          </a:lstStyle>
+          <a:p>
+            <a:r>
+              <a:rPr lang="de-AT" sz="4400" dirty="0">
+                <a:solidFill>
+                  <a:srgbClr val="982348"/>
+                </a:solidFill>
+              </a:rPr>
+              <a:t>Code Review</a:t>
+            </a:r>
+          </a:p>
+        </p:txBody>
+      </p:sp>
+      <p:sp>
+        <p:nvSpPr>
+          <p:cNvPr id="9" name="Foliennummernplatzhalter 5">
+            <a:extLst>
+              <a:ext uri="{FF2B5EF4-FFF2-40B4-BE49-F238E27FC236}">
+                <a16:creationId xmlns:a16="http://schemas.microsoft.com/office/drawing/2014/main" id="{860CC5C1-A2B9-47FF-A8FF-D3E5BDB18ED9}"/>
+              </a:ext>
+            </a:extLst>
+          </p:cNvPr>
           <p:cNvSpPr>
             <a:spLocks noGrp="1"/>
           </p:cNvSpPr>
           <p:nvPr>
-            <p:ph type="subTitle" idx="1"/>
-          </p:nvPr>
-        </p:nvSpPr>
-        <p:spPr/>
-        <p:txBody>
-          <a:bodyPr/>
+            <p:ph type="sldNum" sz="quarter" idx="12"/>
+          </p:nvPr>
+        </p:nvSpPr>
+        <p:spPr>
+          <a:xfrm>
+            <a:off x="10766796" y="6356351"/>
+            <a:ext cx="609441" cy="365125"/>
+          </a:xfrm>
+        </p:spPr>
+        <p:txBody>
+          <a:bodyPr rtlCol="0"/>
           <a:lstStyle/>
           <a:p>
-            <a:endParaRPr lang="de-AT"/>
+            <a:pPr rtl="0"/>
+            <a:endParaRPr lang="de-DE" dirty="0"/>
+          </a:p>
+        </p:txBody>
+      </p:sp>
+      <p:sp>
+        <p:nvSpPr>
+          <p:cNvPr id="10" name="Datumsplatzhalter 3">
+            <a:extLst>
+              <a:ext uri="{FF2B5EF4-FFF2-40B4-BE49-F238E27FC236}">
+                <a16:creationId xmlns:a16="http://schemas.microsoft.com/office/drawing/2014/main" id="{228C930A-702B-4C37-B6DF-8623DE8FE555}"/>
+              </a:ext>
+            </a:extLst>
+          </p:cNvPr>
+          <p:cNvSpPr txBox="1">
+            <a:spLocks/>
+          </p:cNvSpPr>
+          <p:nvPr/>
+        </p:nvSpPr>
+        <p:spPr>
+          <a:xfrm>
+            <a:off x="5501520" y="6356351"/>
+            <a:ext cx="1218883" cy="365125"/>
+          </a:xfrm>
+          <a:prstGeom prst="rect">
+            <a:avLst/>
+          </a:prstGeom>
+        </p:spPr>
+        <p:txBody>
+          <a:bodyPr vert="horz" lIns="91440" tIns="45720" rIns="91440" bIns="45720" rtlCol="0" anchor="ctr"/>
+          <a:lstStyle>
+            <a:defPPr rtl="0">
+              <a:defRPr lang="de-de"/>
+            </a:defPPr>
+            <a:lvl1pPr marL="0" algn="l" defTabSz="914400" rtl="0" eaLnBrk="1" latinLnBrk="0" hangingPunct="1">
+              <a:defRPr sz="1200" kern="1200" cap="all" baseline="0">
+                <a:solidFill>
+                  <a:schemeClr val="tx2"/>
+                </a:solidFill>
+                <a:latin typeface="+mn-lt"/>
+                <a:ea typeface="+mn-ea"/>
+                <a:cs typeface="+mn-cs"/>
+              </a:defRPr>
+            </a:lvl1pPr>
+            <a:lvl2pPr marL="457200" algn="l" defTabSz="914400" rtl="0" eaLnBrk="1" latinLnBrk="0" hangingPunct="1">
+              <a:defRPr sz="1800" kern="1200">
+                <a:solidFill>
+                  <a:schemeClr val="tx1"/>
+                </a:solidFill>
+                <a:latin typeface="+mn-lt"/>
+                <a:ea typeface="+mn-ea"/>
+                <a:cs typeface="+mn-cs"/>
+              </a:defRPr>
+            </a:lvl2pPr>
+            <a:lvl3pPr marL="914400" algn="l" defTabSz="914400" rtl="0" eaLnBrk="1" latinLnBrk="0" hangingPunct="1">
+              <a:defRPr sz="1800" kern="1200">
+                <a:solidFill>
+                  <a:schemeClr val="tx1"/>
+                </a:solidFill>
+                <a:latin typeface="+mn-lt"/>
+                <a:ea typeface="+mn-ea"/>
+                <a:cs typeface="+mn-cs"/>
+              </a:defRPr>
+            </a:lvl3pPr>
+            <a:lvl4pPr marL="1371600" algn="l" defTabSz="914400" rtl="0" eaLnBrk="1" latinLnBrk="0" hangingPunct="1">
+              <a:defRPr sz="1800" kern="1200">
+                <a:solidFill>
+                  <a:schemeClr val="tx1"/>
+                </a:solidFill>
+                <a:latin typeface="+mn-lt"/>
+                <a:ea typeface="+mn-ea"/>
+                <a:cs typeface="+mn-cs"/>
+              </a:defRPr>
+            </a:lvl4pPr>
+            <a:lvl5pPr marL="1828800" algn="l" defTabSz="914400" rtl="0" eaLnBrk="1" latinLnBrk="0" hangingPunct="1">
+              <a:defRPr sz="1800" kern="1200">
+                <a:solidFill>
+                  <a:schemeClr val="tx1"/>
+                </a:solidFill>
+                <a:latin typeface="+mn-lt"/>
+                <a:ea typeface="+mn-ea"/>
+                <a:cs typeface="+mn-cs"/>
+              </a:defRPr>
+            </a:lvl5pPr>
+            <a:lvl6pPr marL="2286000" algn="l" defTabSz="914400" rtl="0" eaLnBrk="1" latinLnBrk="0" hangingPunct="1">
+              <a:defRPr sz="1800" kern="1200">
+                <a:solidFill>
+                  <a:schemeClr val="tx1"/>
+                </a:solidFill>
+                <a:latin typeface="+mn-lt"/>
+                <a:ea typeface="+mn-ea"/>
+                <a:cs typeface="+mn-cs"/>
+              </a:defRPr>
+            </a:lvl6pPr>
+            <a:lvl7pPr marL="2743200" algn="l" defTabSz="914400" rtl="0" eaLnBrk="1" latinLnBrk="0" hangingPunct="1">
+              <a:defRPr sz="1800" kern="1200">
+                <a:solidFill>
+                  <a:schemeClr val="tx1"/>
+                </a:solidFill>
+                <a:latin typeface="+mn-lt"/>
+                <a:ea typeface="+mn-ea"/>
+                <a:cs typeface="+mn-cs"/>
+              </a:defRPr>
+            </a:lvl7pPr>
+            <a:lvl8pPr marL="3200400" algn="l" defTabSz="914400" rtl="0" eaLnBrk="1" latinLnBrk="0" hangingPunct="1">
+              <a:defRPr sz="1800" kern="1200">
+                <a:solidFill>
+                  <a:schemeClr val="tx1"/>
+                </a:solidFill>
+                <a:latin typeface="+mn-lt"/>
+                <a:ea typeface="+mn-ea"/>
+                <a:cs typeface="+mn-cs"/>
+              </a:defRPr>
+            </a:lvl8pPr>
+            <a:lvl9pPr marL="3657600" algn="l" defTabSz="914400" rtl="0" eaLnBrk="1" latinLnBrk="0" hangingPunct="1">
+              <a:defRPr sz="1800" kern="1200">
+                <a:solidFill>
+                  <a:schemeClr val="tx1"/>
+                </a:solidFill>
+                <a:latin typeface="+mn-lt"/>
+                <a:ea typeface="+mn-ea"/>
+                <a:cs typeface="+mn-cs"/>
+              </a:defRPr>
+            </a:lvl9pPr>
+          </a:lstStyle>
+          <a:p>
+            <a:r>
+              <a:rPr lang="de-DE" dirty="0"/>
+              <a:t>19.12.2022</a:t>
+            </a:r>
+          </a:p>
+        </p:txBody>
+      </p:sp>
+      <p:sp>
+        <p:nvSpPr>
+          <p:cNvPr id="11" name="Fußzeilenplatzhalter 4">
+            <a:extLst>
+              <a:ext uri="{FF2B5EF4-FFF2-40B4-BE49-F238E27FC236}">
+                <a16:creationId xmlns:a16="http://schemas.microsoft.com/office/drawing/2014/main" id="{6925AA01-25BA-419B-B2D0-98F3975B4E13}"/>
+              </a:ext>
+            </a:extLst>
+          </p:cNvPr>
+          <p:cNvSpPr txBox="1">
+            <a:spLocks/>
+          </p:cNvSpPr>
+          <p:nvPr/>
+        </p:nvSpPr>
+        <p:spPr>
+          <a:xfrm>
+            <a:off x="6687305" y="6356351"/>
+            <a:ext cx="3974065" cy="365125"/>
+          </a:xfrm>
+          <a:prstGeom prst="rect">
+            <a:avLst/>
+          </a:prstGeom>
+        </p:spPr>
+        <p:txBody>
+          <a:bodyPr vert="horz" lIns="91440" tIns="45720" rIns="91440" bIns="45720" rtlCol="0" anchor="ctr"/>
+          <a:lstStyle>
+            <a:defPPr rtl="0">
+              <a:defRPr lang="de-de"/>
+            </a:defPPr>
+            <a:lvl1pPr marL="0" algn="ctr" defTabSz="914400" rtl="0" eaLnBrk="1" latinLnBrk="0" hangingPunct="1">
+              <a:defRPr sz="1200" b="1" kern="1200" cap="none" baseline="0">
+                <a:solidFill>
+                  <a:schemeClr val="tx2"/>
+                </a:solidFill>
+                <a:latin typeface="+mn-lt"/>
+                <a:ea typeface="+mn-ea"/>
+                <a:cs typeface="+mn-cs"/>
+              </a:defRPr>
+            </a:lvl1pPr>
+            <a:lvl2pPr marL="457200" algn="l" defTabSz="914400" rtl="0" eaLnBrk="1" latinLnBrk="0" hangingPunct="1">
+              <a:defRPr sz="1800" kern="1200">
+                <a:solidFill>
+                  <a:schemeClr val="tx1"/>
+                </a:solidFill>
+                <a:latin typeface="+mn-lt"/>
+                <a:ea typeface="+mn-ea"/>
+                <a:cs typeface="+mn-cs"/>
+              </a:defRPr>
+            </a:lvl2pPr>
+            <a:lvl3pPr marL="914400" algn="l" defTabSz="914400" rtl="0" eaLnBrk="1" latinLnBrk="0" hangingPunct="1">
+              <a:defRPr sz="1800" kern="1200">
+                <a:solidFill>
+                  <a:schemeClr val="tx1"/>
+                </a:solidFill>
+                <a:latin typeface="+mn-lt"/>
+                <a:ea typeface="+mn-ea"/>
+                <a:cs typeface="+mn-cs"/>
+              </a:defRPr>
+            </a:lvl3pPr>
+            <a:lvl4pPr marL="1371600" algn="l" defTabSz="914400" rtl="0" eaLnBrk="1" latinLnBrk="0" hangingPunct="1">
+              <a:defRPr sz="1800" kern="1200">
+                <a:solidFill>
+                  <a:schemeClr val="tx1"/>
+                </a:solidFill>
+                <a:latin typeface="+mn-lt"/>
+                <a:ea typeface="+mn-ea"/>
+                <a:cs typeface="+mn-cs"/>
+              </a:defRPr>
+            </a:lvl4pPr>
+            <a:lvl5pPr marL="1828800" algn="l" defTabSz="914400" rtl="0" eaLnBrk="1" latinLnBrk="0" hangingPunct="1">
+              <a:defRPr sz="1800" kern="1200">
+                <a:solidFill>
+                  <a:schemeClr val="tx1"/>
+                </a:solidFill>
+                <a:latin typeface="+mn-lt"/>
+                <a:ea typeface="+mn-ea"/>
+                <a:cs typeface="+mn-cs"/>
+              </a:defRPr>
+            </a:lvl5pPr>
+            <a:lvl6pPr marL="2286000" algn="l" defTabSz="914400" rtl="0" eaLnBrk="1" latinLnBrk="0" hangingPunct="1">
+              <a:defRPr sz="1800" kern="1200">
+                <a:solidFill>
+                  <a:schemeClr val="tx1"/>
+                </a:solidFill>
+                <a:latin typeface="+mn-lt"/>
+                <a:ea typeface="+mn-ea"/>
+                <a:cs typeface="+mn-cs"/>
+              </a:defRPr>
+            </a:lvl6pPr>
+            <a:lvl7pPr marL="2743200" algn="l" defTabSz="914400" rtl="0" eaLnBrk="1" latinLnBrk="0" hangingPunct="1">
+              <a:defRPr sz="1800" kern="1200">
+                <a:solidFill>
+                  <a:schemeClr val="tx1"/>
+                </a:solidFill>
+                <a:latin typeface="+mn-lt"/>
+                <a:ea typeface="+mn-ea"/>
+                <a:cs typeface="+mn-cs"/>
+              </a:defRPr>
+            </a:lvl7pPr>
+            <a:lvl8pPr marL="3200400" algn="l" defTabSz="914400" rtl="0" eaLnBrk="1" latinLnBrk="0" hangingPunct="1">
+              <a:defRPr sz="1800" kern="1200">
+                <a:solidFill>
+                  <a:schemeClr val="tx1"/>
+                </a:solidFill>
+                <a:latin typeface="+mn-lt"/>
+                <a:ea typeface="+mn-ea"/>
+                <a:cs typeface="+mn-cs"/>
+              </a:defRPr>
+            </a:lvl8pPr>
+            <a:lvl9pPr marL="3657600" algn="l" defTabSz="914400" rtl="0" eaLnBrk="1" latinLnBrk="0" hangingPunct="1">
+              <a:defRPr sz="1800" kern="1200">
+                <a:solidFill>
+                  <a:schemeClr val="tx1"/>
+                </a:solidFill>
+                <a:latin typeface="+mn-lt"/>
+                <a:ea typeface="+mn-ea"/>
+                <a:cs typeface="+mn-cs"/>
+              </a:defRPr>
+            </a:lvl9pPr>
+          </a:lstStyle>
+          <a:p>
+            <a:r>
+              <a:rPr lang="de-DE"/>
+              <a:t>Präsentation</a:t>
+            </a:r>
           </a:p>
         </p:txBody>
       </p:sp>
@@ -7820,6 +7630,409 @@
     <p:extLst>
       <p:ext uri="{BB962C8B-B14F-4D97-AF65-F5344CB8AC3E}">
         <p14:creationId xmlns:p14="http://schemas.microsoft.com/office/powerpoint/2010/main" val="1492496892"/>
+      </p:ext>
+    </p:extLst>
+  </p:cSld>
+  <p:clrMapOvr>
+    <a:masterClrMapping/>
+  </p:clrMapOvr>
+  <mc:AlternateContent xmlns:mc="http://schemas.openxmlformats.org/markup-compatibility/2006" xmlns:p14="http://schemas.microsoft.com/office/powerpoint/2010/main">
+    <mc:Choice Requires="p14">
+      <p:transition spd="med" p14:dur="700">
+        <p:fade/>
+      </p:transition>
+    </mc:Choice>
+    <mc:Fallback xmlns="">
+      <p:transition spd="med">
+        <p:fade/>
+      </p:transition>
+    </mc:Fallback>
+  </mc:AlternateContent>
+</p:sld>
+</file>
+
+<file path=ppt/slides/slide18.xml><?xml version="1.0" encoding="utf-8"?>
+<p:sld xmlns:a="http://schemas.openxmlformats.org/drawingml/2006/main" xmlns:r="http://schemas.openxmlformats.org/officeDocument/2006/relationships" xmlns:p="http://schemas.openxmlformats.org/presentationml/2006/main">
+  <p:cSld>
+    <p:spTree>
+      <p:nvGrpSpPr>
+        <p:cNvPr id="1" name=""/>
+        <p:cNvGrpSpPr/>
+        <p:nvPr/>
+      </p:nvGrpSpPr>
+      <p:grpSpPr>
+        <a:xfrm>
+          <a:off x="0" y="0"/>
+          <a:ext cx="0" cy="0"/>
+          <a:chOff x="0" y="0"/>
+          <a:chExt cx="0" cy="0"/>
+        </a:xfrm>
+      </p:grpSpPr>
+      <p:sp>
+        <p:nvSpPr>
+          <p:cNvPr id="2" name="Titel 1"/>
+          <p:cNvSpPr>
+            <a:spLocks noGrp="1"/>
+          </p:cNvSpPr>
+          <p:nvPr>
+            <p:ph type="ctrTitle"/>
+          </p:nvPr>
+        </p:nvSpPr>
+        <p:spPr/>
+        <p:txBody>
+          <a:bodyPr rtlCol="0"/>
+          <a:lstStyle/>
+          <a:p>
+            <a:pPr rtl="0"/>
+            <a:r>
+              <a:rPr lang="de-DE" dirty="0">
+                <a:solidFill>
+                  <a:srgbClr val="982348"/>
+                </a:solidFill>
+              </a:rPr>
+              <a:t>Wir danken für</a:t>
+            </a:r>
+            <a:br>
+              <a:rPr lang="de-DE" dirty="0">
+                <a:solidFill>
+                  <a:srgbClr val="982348"/>
+                </a:solidFill>
+              </a:rPr>
+            </a:br>
+            <a:r>
+              <a:rPr lang="de-DE" dirty="0">
+                <a:solidFill>
+                  <a:srgbClr val="982348"/>
+                </a:solidFill>
+              </a:rPr>
+              <a:t>Ihre Aufmerksamkeit!</a:t>
+            </a:r>
+          </a:p>
+        </p:txBody>
+      </p:sp>
+      <p:graphicFrame>
+        <p:nvGraphicFramePr>
+          <p:cNvPr id="8" name="Objekt 7">
+            <a:extLst>
+              <a:ext uri="{FF2B5EF4-FFF2-40B4-BE49-F238E27FC236}">
+                <a16:creationId xmlns:a16="http://schemas.microsoft.com/office/drawing/2014/main" id="{02D3B34F-D0F9-41E6-A9FB-9BCDEC7F7DC0}"/>
+              </a:ext>
+            </a:extLst>
+          </p:cNvPr>
+          <p:cNvGraphicFramePr>
+            <a:graphicFrameLocks noChangeAspect="1"/>
+          </p:cNvGraphicFramePr>
+          <p:nvPr/>
+        </p:nvGraphicFramePr>
+        <p:xfrm>
+          <a:off x="9702200" y="136524"/>
+          <a:ext cx="2129191" cy="792088"/>
+        </p:xfrm>
+        <a:graphic>
+          <a:graphicData uri="http://schemas.openxmlformats.org/presentationml/2006/ole">
+            <mc:AlternateContent xmlns:mc="http://schemas.openxmlformats.org/markup-compatibility/2006">
+              <mc:Choice xmlns:v="urn:schemas-microsoft-com:vml" Requires="v">
+                <p:oleObj spid="_x0000_s31750" r:id="rId4" imgW="3720600" imgH="1383840" progId="">
+                  <p:embed/>
+                </p:oleObj>
+              </mc:Choice>
+              <mc:Fallback>
+                <p:oleObj r:id="rId4" imgW="3720600" imgH="1383840" progId="">
+                  <p:embed/>
+                  <p:pic>
+                    <p:nvPicPr>
+                      <p:cNvPr id="8" name="Objekt 7">
+                        <a:extLst>
+                          <a:ext uri="{FF2B5EF4-FFF2-40B4-BE49-F238E27FC236}">
+                            <a16:creationId xmlns:a16="http://schemas.microsoft.com/office/drawing/2014/main" id="{02D3B34F-D0F9-41E6-A9FB-9BCDEC7F7DC0}"/>
+                          </a:ext>
+                        </a:extLst>
+                      </p:cNvPr>
+                      <p:cNvPicPr/>
+                      <p:nvPr/>
+                    </p:nvPicPr>
+                    <p:blipFill>
+                      <a:blip r:embed="rId5"/>
+                      <a:stretch>
+                        <a:fillRect/>
+                      </a:stretch>
+                    </p:blipFill>
+                    <p:spPr>
+                      <a:xfrm>
+                        <a:off x="9702200" y="136524"/>
+                        <a:ext cx="2129191" cy="792088"/>
+                      </a:xfrm>
+                      <a:prstGeom prst="rect">
+                        <a:avLst/>
+                      </a:prstGeom>
+                    </p:spPr>
+                  </p:pic>
+                </p:oleObj>
+              </mc:Fallback>
+            </mc:AlternateContent>
+          </a:graphicData>
+        </a:graphic>
+      </p:graphicFrame>
+      <p:sp>
+        <p:nvSpPr>
+          <p:cNvPr id="5" name="Datumsplatzhalter 3">
+            <a:extLst>
+              <a:ext uri="{FF2B5EF4-FFF2-40B4-BE49-F238E27FC236}">
+                <a16:creationId xmlns:a16="http://schemas.microsoft.com/office/drawing/2014/main" id="{6938CB30-761F-4F4E-8259-726FE726C7C4}"/>
+              </a:ext>
+            </a:extLst>
+          </p:cNvPr>
+          <p:cNvSpPr txBox="1">
+            <a:spLocks/>
+          </p:cNvSpPr>
+          <p:nvPr/>
+        </p:nvSpPr>
+        <p:spPr>
+          <a:xfrm>
+            <a:off x="5501520" y="6356351"/>
+            <a:ext cx="1218883" cy="365125"/>
+          </a:xfrm>
+          <a:prstGeom prst="rect">
+            <a:avLst/>
+          </a:prstGeom>
+        </p:spPr>
+        <p:txBody>
+          <a:bodyPr vert="horz" lIns="91440" tIns="45720" rIns="91440" bIns="45720" rtlCol="0" anchor="ctr"/>
+          <a:lstStyle>
+            <a:defPPr rtl="0">
+              <a:defRPr lang="de-de"/>
+            </a:defPPr>
+            <a:lvl1pPr marL="0" algn="l" defTabSz="914400" rtl="0" eaLnBrk="1" latinLnBrk="0" hangingPunct="1">
+              <a:defRPr sz="1200" kern="1200" cap="all" baseline="0">
+                <a:solidFill>
+                  <a:schemeClr val="tx2"/>
+                </a:solidFill>
+                <a:latin typeface="+mn-lt"/>
+                <a:ea typeface="+mn-ea"/>
+                <a:cs typeface="+mn-cs"/>
+              </a:defRPr>
+            </a:lvl1pPr>
+            <a:lvl2pPr marL="457200" algn="l" defTabSz="914400" rtl="0" eaLnBrk="1" latinLnBrk="0" hangingPunct="1">
+              <a:defRPr sz="1800" kern="1200">
+                <a:solidFill>
+                  <a:schemeClr val="tx1"/>
+                </a:solidFill>
+                <a:latin typeface="+mn-lt"/>
+                <a:ea typeface="+mn-ea"/>
+                <a:cs typeface="+mn-cs"/>
+              </a:defRPr>
+            </a:lvl2pPr>
+            <a:lvl3pPr marL="914400" algn="l" defTabSz="914400" rtl="0" eaLnBrk="1" latinLnBrk="0" hangingPunct="1">
+              <a:defRPr sz="1800" kern="1200">
+                <a:solidFill>
+                  <a:schemeClr val="tx1"/>
+                </a:solidFill>
+                <a:latin typeface="+mn-lt"/>
+                <a:ea typeface="+mn-ea"/>
+                <a:cs typeface="+mn-cs"/>
+              </a:defRPr>
+            </a:lvl3pPr>
+            <a:lvl4pPr marL="1371600" algn="l" defTabSz="914400" rtl="0" eaLnBrk="1" latinLnBrk="0" hangingPunct="1">
+              <a:defRPr sz="1800" kern="1200">
+                <a:solidFill>
+                  <a:schemeClr val="tx1"/>
+                </a:solidFill>
+                <a:latin typeface="+mn-lt"/>
+                <a:ea typeface="+mn-ea"/>
+                <a:cs typeface="+mn-cs"/>
+              </a:defRPr>
+            </a:lvl4pPr>
+            <a:lvl5pPr marL="1828800" algn="l" defTabSz="914400" rtl="0" eaLnBrk="1" latinLnBrk="0" hangingPunct="1">
+              <a:defRPr sz="1800" kern="1200">
+                <a:solidFill>
+                  <a:schemeClr val="tx1"/>
+                </a:solidFill>
+                <a:latin typeface="+mn-lt"/>
+                <a:ea typeface="+mn-ea"/>
+                <a:cs typeface="+mn-cs"/>
+              </a:defRPr>
+            </a:lvl5pPr>
+            <a:lvl6pPr marL="2286000" algn="l" defTabSz="914400" rtl="0" eaLnBrk="1" latinLnBrk="0" hangingPunct="1">
+              <a:defRPr sz="1800" kern="1200">
+                <a:solidFill>
+                  <a:schemeClr val="tx1"/>
+                </a:solidFill>
+                <a:latin typeface="+mn-lt"/>
+                <a:ea typeface="+mn-ea"/>
+                <a:cs typeface="+mn-cs"/>
+              </a:defRPr>
+            </a:lvl6pPr>
+            <a:lvl7pPr marL="2743200" algn="l" defTabSz="914400" rtl="0" eaLnBrk="1" latinLnBrk="0" hangingPunct="1">
+              <a:defRPr sz="1800" kern="1200">
+                <a:solidFill>
+                  <a:schemeClr val="tx1"/>
+                </a:solidFill>
+                <a:latin typeface="+mn-lt"/>
+                <a:ea typeface="+mn-ea"/>
+                <a:cs typeface="+mn-cs"/>
+              </a:defRPr>
+            </a:lvl7pPr>
+            <a:lvl8pPr marL="3200400" algn="l" defTabSz="914400" rtl="0" eaLnBrk="1" latinLnBrk="0" hangingPunct="1">
+              <a:defRPr sz="1800" kern="1200">
+                <a:solidFill>
+                  <a:schemeClr val="tx1"/>
+                </a:solidFill>
+                <a:latin typeface="+mn-lt"/>
+                <a:ea typeface="+mn-ea"/>
+                <a:cs typeface="+mn-cs"/>
+              </a:defRPr>
+            </a:lvl8pPr>
+            <a:lvl9pPr marL="3657600" algn="l" defTabSz="914400" rtl="0" eaLnBrk="1" latinLnBrk="0" hangingPunct="1">
+              <a:defRPr sz="1800" kern="1200">
+                <a:solidFill>
+                  <a:schemeClr val="tx1"/>
+                </a:solidFill>
+                <a:latin typeface="+mn-lt"/>
+                <a:ea typeface="+mn-ea"/>
+                <a:cs typeface="+mn-cs"/>
+              </a:defRPr>
+            </a:lvl9pPr>
+          </a:lstStyle>
+          <a:p>
+            <a:r>
+              <a:rPr lang="de-DE" dirty="0"/>
+              <a:t>19.12.2022</a:t>
+            </a:r>
+          </a:p>
+        </p:txBody>
+      </p:sp>
+      <p:sp>
+        <p:nvSpPr>
+          <p:cNvPr id="6" name="Fußzeilenplatzhalter 4">
+            <a:extLst>
+              <a:ext uri="{FF2B5EF4-FFF2-40B4-BE49-F238E27FC236}">
+                <a16:creationId xmlns:a16="http://schemas.microsoft.com/office/drawing/2014/main" id="{A5F43EA6-EFF7-4733-B10A-A6254C91CCA5}"/>
+              </a:ext>
+            </a:extLst>
+          </p:cNvPr>
+          <p:cNvSpPr txBox="1">
+            <a:spLocks/>
+          </p:cNvSpPr>
+          <p:nvPr/>
+        </p:nvSpPr>
+        <p:spPr>
+          <a:xfrm>
+            <a:off x="6687305" y="6356351"/>
+            <a:ext cx="3974065" cy="365125"/>
+          </a:xfrm>
+          <a:prstGeom prst="rect">
+            <a:avLst/>
+          </a:prstGeom>
+        </p:spPr>
+        <p:txBody>
+          <a:bodyPr vert="horz" lIns="91440" tIns="45720" rIns="91440" bIns="45720" rtlCol="0" anchor="ctr"/>
+          <a:lstStyle>
+            <a:defPPr rtl="0">
+              <a:defRPr lang="de-de"/>
+            </a:defPPr>
+            <a:lvl1pPr marL="0" algn="ctr" defTabSz="914400" rtl="0" eaLnBrk="1" latinLnBrk="0" hangingPunct="1">
+              <a:defRPr sz="1200" b="1" kern="1200" cap="none" baseline="0">
+                <a:solidFill>
+                  <a:schemeClr val="tx2"/>
+                </a:solidFill>
+                <a:latin typeface="+mn-lt"/>
+                <a:ea typeface="+mn-ea"/>
+                <a:cs typeface="+mn-cs"/>
+              </a:defRPr>
+            </a:lvl1pPr>
+            <a:lvl2pPr marL="457200" algn="l" defTabSz="914400" rtl="0" eaLnBrk="1" latinLnBrk="0" hangingPunct="1">
+              <a:defRPr sz="1800" kern="1200">
+                <a:solidFill>
+                  <a:schemeClr val="tx1"/>
+                </a:solidFill>
+                <a:latin typeface="+mn-lt"/>
+                <a:ea typeface="+mn-ea"/>
+                <a:cs typeface="+mn-cs"/>
+              </a:defRPr>
+            </a:lvl2pPr>
+            <a:lvl3pPr marL="914400" algn="l" defTabSz="914400" rtl="0" eaLnBrk="1" latinLnBrk="0" hangingPunct="1">
+              <a:defRPr sz="1800" kern="1200">
+                <a:solidFill>
+                  <a:schemeClr val="tx1"/>
+                </a:solidFill>
+                <a:latin typeface="+mn-lt"/>
+                <a:ea typeface="+mn-ea"/>
+                <a:cs typeface="+mn-cs"/>
+              </a:defRPr>
+            </a:lvl3pPr>
+            <a:lvl4pPr marL="1371600" algn="l" defTabSz="914400" rtl="0" eaLnBrk="1" latinLnBrk="0" hangingPunct="1">
+              <a:defRPr sz="1800" kern="1200">
+                <a:solidFill>
+                  <a:schemeClr val="tx1"/>
+                </a:solidFill>
+                <a:latin typeface="+mn-lt"/>
+                <a:ea typeface="+mn-ea"/>
+                <a:cs typeface="+mn-cs"/>
+              </a:defRPr>
+            </a:lvl4pPr>
+            <a:lvl5pPr marL="1828800" algn="l" defTabSz="914400" rtl="0" eaLnBrk="1" latinLnBrk="0" hangingPunct="1">
+              <a:defRPr sz="1800" kern="1200">
+                <a:solidFill>
+                  <a:schemeClr val="tx1"/>
+                </a:solidFill>
+                <a:latin typeface="+mn-lt"/>
+                <a:ea typeface="+mn-ea"/>
+                <a:cs typeface="+mn-cs"/>
+              </a:defRPr>
+            </a:lvl5pPr>
+            <a:lvl6pPr marL="2286000" algn="l" defTabSz="914400" rtl="0" eaLnBrk="1" latinLnBrk="0" hangingPunct="1">
+              <a:defRPr sz="1800" kern="1200">
+                <a:solidFill>
+                  <a:schemeClr val="tx1"/>
+                </a:solidFill>
+                <a:latin typeface="+mn-lt"/>
+                <a:ea typeface="+mn-ea"/>
+                <a:cs typeface="+mn-cs"/>
+              </a:defRPr>
+            </a:lvl6pPr>
+            <a:lvl7pPr marL="2743200" algn="l" defTabSz="914400" rtl="0" eaLnBrk="1" latinLnBrk="0" hangingPunct="1">
+              <a:defRPr sz="1800" kern="1200">
+                <a:solidFill>
+                  <a:schemeClr val="tx1"/>
+                </a:solidFill>
+                <a:latin typeface="+mn-lt"/>
+                <a:ea typeface="+mn-ea"/>
+                <a:cs typeface="+mn-cs"/>
+              </a:defRPr>
+            </a:lvl7pPr>
+            <a:lvl8pPr marL="3200400" algn="l" defTabSz="914400" rtl="0" eaLnBrk="1" latinLnBrk="0" hangingPunct="1">
+              <a:defRPr sz="1800" kern="1200">
+                <a:solidFill>
+                  <a:schemeClr val="tx1"/>
+                </a:solidFill>
+                <a:latin typeface="+mn-lt"/>
+                <a:ea typeface="+mn-ea"/>
+                <a:cs typeface="+mn-cs"/>
+              </a:defRPr>
+            </a:lvl8pPr>
+            <a:lvl9pPr marL="3657600" algn="l" defTabSz="914400" rtl="0" eaLnBrk="1" latinLnBrk="0" hangingPunct="1">
+              <a:defRPr sz="1800" kern="1200">
+                <a:solidFill>
+                  <a:schemeClr val="tx1"/>
+                </a:solidFill>
+                <a:latin typeface="+mn-lt"/>
+                <a:ea typeface="+mn-ea"/>
+                <a:cs typeface="+mn-cs"/>
+              </a:defRPr>
+            </a:lvl9pPr>
+          </a:lstStyle>
+          <a:p>
+            <a:r>
+              <a:rPr lang="de-DE"/>
+              <a:t>Präsentation</a:t>
+            </a:r>
+          </a:p>
+        </p:txBody>
+      </p:sp>
+    </p:spTree>
+    <p:extLst>
+      <p:ext uri="{BB962C8B-B14F-4D97-AF65-F5344CB8AC3E}">
+        <p14:creationId xmlns:p14="http://schemas.microsoft.com/office/powerpoint/2010/main" val="910330996"/>
       </p:ext>
     </p:extLst>
   </p:cSld>
@@ -7905,15 +8118,7 @@
             <a:pPr rtl="0"/>
             <a:r>
               <a:rPr lang="de-DE" dirty="0"/>
-              <a:t>Spieler bewegt Mouse über das Bild eines </a:t>
-            </a:r>
-            <a:r>
-              <a:rPr lang="de-DE" dirty="0" err="1"/>
-              <a:t>Labyrints</a:t>
-            </a:r>
-            <a:r>
-              <a:rPr lang="de-DE" dirty="0"/>
-              <a:t> und darf dabei die Wand nicht berühren</a:t>
+              <a:t>Spieler*in bewegt Mouse über das Bild eines Labyrinths und darf dabei die Wand nicht berühren</a:t>
             </a:r>
           </a:p>
           <a:p>
@@ -7954,7 +8159,7 @@
             <a:pPr rtl="0"/>
             <a:r>
               <a:rPr lang="de-DE" dirty="0"/>
-              <a:t>Highscore – wenn das Ziel erreicht wird, bekommt der Spieler </a:t>
+              <a:t>Highscore – wenn das Ziel erreicht wird, werden </a:t>
             </a:r>
             <a:r>
               <a:rPr lang="de-DE" dirty="0" err="1"/>
@@ -7962,7 +8167,14 @@
             </a:r>
             <a:r>
               <a:rPr lang="de-DE" dirty="0"/>
-              <a:t> in Form von der Restzeit gutgeschrieben</a:t>
+              <a:t> </a:t>
+            </a:r>
+            <a:br>
+              <a:rPr lang="de-DE" dirty="0"/>
+            </a:br>
+            <a:r>
+              <a:rPr lang="de-DE" dirty="0"/>
+              <a:t>in Form von der Restzeit gutgeschrieben</a:t>
             </a:r>
           </a:p>
           <a:p>
@@ -8015,7 +8227,7 @@
           <a:graphicData uri="http://schemas.openxmlformats.org/presentationml/2006/ole">
             <mc:AlternateContent xmlns:mc="http://schemas.openxmlformats.org/markup-compatibility/2006">
               <mc:Choice xmlns:v="urn:schemas-microsoft-com:vml" Requires="v">
-                <p:oleObj spid="_x0000_s5131" r:id="rId4" imgW="3720600" imgH="1383840" progId="">
+                <p:oleObj spid="_x0000_s5136" r:id="rId4" imgW="3720600" imgH="1383840" progId="">
                   <p:embed/>
                 </p:oleObj>
               </mc:Choice>
@@ -8056,97 +8268,6 @@
           </a:graphicData>
         </a:graphic>
       </p:graphicFrame>
-      <p:sp>
-        <p:nvSpPr>
-          <p:cNvPr id="8" name="Foliennummernplatzhalter 5">
-            <a:extLst>
-              <a:ext uri="{FF2B5EF4-FFF2-40B4-BE49-F238E27FC236}">
-                <a16:creationId xmlns:a16="http://schemas.microsoft.com/office/drawing/2014/main" id="{76FE2398-C068-42EA-A205-BF98DD7176F1}"/>
-              </a:ext>
-            </a:extLst>
-          </p:cNvPr>
-          <p:cNvSpPr>
-            <a:spLocks noGrp="1"/>
-          </p:cNvSpPr>
-          <p:nvPr>
-            <p:ph type="sldNum" sz="quarter" idx="12"/>
-          </p:nvPr>
-        </p:nvSpPr>
-        <p:spPr>
-          <a:xfrm>
-            <a:off x="10766796" y="6356351"/>
-            <a:ext cx="609441" cy="365125"/>
-          </a:xfrm>
-        </p:spPr>
-        <p:txBody>
-          <a:bodyPr rtlCol="0"/>
-          <a:lstStyle/>
-          <a:p>
-            <a:pPr rtl="0"/>
-            <a:fld id="{7DC1BBB0-96F0-4077-A278-0F3FB5C104D3}" type="slidenum">
-              <a:rPr lang="de-DE"/>
-              <a:t>2</a:t>
-            </a:fld>
-            <a:endParaRPr lang="de-DE"/>
-          </a:p>
-        </p:txBody>
-      </p:sp>
-      <p:sp>
-        <p:nvSpPr>
-          <p:cNvPr id="9" name="Rechteck 8">
-            <a:extLst>
-              <a:ext uri="{FF2B5EF4-FFF2-40B4-BE49-F238E27FC236}">
-                <a16:creationId xmlns:a16="http://schemas.microsoft.com/office/drawing/2014/main" id="{8A61D302-7564-4C42-B408-F2B56F47DA2B}"/>
-              </a:ext>
-            </a:extLst>
-          </p:cNvPr>
-          <p:cNvSpPr/>
-          <p:nvPr/>
-        </p:nvSpPr>
-        <p:spPr bwMode="gray">
-          <a:xfrm>
-            <a:off x="625808" y="0"/>
-            <a:ext cx="644068" cy="6858000"/>
-          </a:xfrm>
-          <a:prstGeom prst="rect">
-            <a:avLst/>
-          </a:prstGeom>
-          <a:solidFill>
-            <a:srgbClr val="6A8093"/>
-          </a:solidFill>
-          <a:ln>
-            <a:noFill/>
-          </a:ln>
-        </p:spPr>
-        <p:style>
-          <a:lnRef idx="2">
-            <a:schemeClr val="accent1">
-              <a:shade val="50000"/>
-            </a:schemeClr>
-          </a:lnRef>
-          <a:fillRef idx="1">
-            <a:schemeClr val="accent1"/>
-          </a:fillRef>
-          <a:effectRef idx="0">
-            <a:schemeClr val="accent1"/>
-          </a:effectRef>
-          <a:fontRef idx="minor">
-            <a:schemeClr val="lt1"/>
-          </a:fontRef>
-        </p:style>
-        <p:txBody>
-          <a:bodyPr lIns="121899" tIns="60949" rIns="121899" bIns="60949" rtlCol="0" anchor="ctr"/>
-          <a:lstStyle/>
-          <a:p>
-            <a:pPr algn="ctr" rtl="0"/>
-            <a:endParaRPr lang="de-DE" dirty="0">
-              <a:solidFill>
-                <a:srgbClr val="7C8FA0"/>
-              </a:solidFill>
-            </a:endParaRPr>
-          </a:p>
-        </p:txBody>
-      </p:sp>
     </p:spTree>
     <p:extLst>
       <p:ext uri="{BB962C8B-B14F-4D97-AF65-F5344CB8AC3E}">
@@ -8238,7 +8359,7 @@
           <a:graphicData uri="http://schemas.openxmlformats.org/presentationml/2006/ole">
             <mc:AlternateContent xmlns:mc="http://schemas.openxmlformats.org/markup-compatibility/2006">
               <mc:Choice xmlns:v="urn:schemas-microsoft-com:vml" Requires="v">
-                <p:oleObj spid="_x0000_s6155" r:id="rId4" imgW="3720600" imgH="1383840" progId="">
+                <p:oleObj spid="_x0000_s6160" r:id="rId4" imgW="3720600" imgH="1383840" progId="">
                   <p:embed/>
                 </p:oleObj>
               </mc:Choice>
@@ -8279,41 +8400,6 @@
           </a:graphicData>
         </a:graphic>
       </p:graphicFrame>
-      <p:sp>
-        <p:nvSpPr>
-          <p:cNvPr id="5" name="Foliennummernplatzhalter 5">
-            <a:extLst>
-              <a:ext uri="{FF2B5EF4-FFF2-40B4-BE49-F238E27FC236}">
-                <a16:creationId xmlns:a16="http://schemas.microsoft.com/office/drawing/2014/main" id="{3D79B3E5-D500-4756-BF6D-C0C74895E838}"/>
-              </a:ext>
-            </a:extLst>
-          </p:cNvPr>
-          <p:cNvSpPr>
-            <a:spLocks noGrp="1"/>
-          </p:cNvSpPr>
-          <p:nvPr>
-            <p:ph type="sldNum" sz="quarter" idx="12"/>
-          </p:nvPr>
-        </p:nvSpPr>
-        <p:spPr>
-          <a:xfrm>
-            <a:off x="10766796" y="6356351"/>
-            <a:ext cx="609441" cy="365125"/>
-          </a:xfrm>
-        </p:spPr>
-        <p:txBody>
-          <a:bodyPr rtlCol="0"/>
-          <a:lstStyle/>
-          <a:p>
-            <a:pPr rtl="0"/>
-            <a:fld id="{7DC1BBB0-96F0-4077-A278-0F3FB5C104D3}" type="slidenum">
-              <a:rPr lang="de-DE"/>
-              <a:t>3</a:t>
-            </a:fld>
-            <a:endParaRPr lang="de-DE"/>
-          </a:p>
-        </p:txBody>
-      </p:sp>
       <p:pic>
         <p:nvPicPr>
           <p:cNvPr id="6" name="Inhaltsplatzhalter 5">
@@ -8477,7 +8563,7 @@
           <a:graphicData uri="http://schemas.openxmlformats.org/presentationml/2006/ole">
             <mc:AlternateContent xmlns:mc="http://schemas.openxmlformats.org/markup-compatibility/2006">
               <mc:Choice xmlns:v="urn:schemas-microsoft-com:vml" Requires="v">
-                <p:oleObj spid="_x0000_s7179" r:id="rId5" imgW="3720600" imgH="1383840" progId="">
+                <p:oleObj spid="_x0000_s7184" r:id="rId5" imgW="3720600" imgH="1383840" progId="">
                   <p:embed/>
                 </p:oleObj>
               </mc:Choice>
@@ -8518,41 +8604,6 @@
           </a:graphicData>
         </a:graphic>
       </p:graphicFrame>
-      <p:sp>
-        <p:nvSpPr>
-          <p:cNvPr id="5" name="Foliennummernplatzhalter 5">
-            <a:extLst>
-              <a:ext uri="{FF2B5EF4-FFF2-40B4-BE49-F238E27FC236}">
-                <a16:creationId xmlns:a16="http://schemas.microsoft.com/office/drawing/2014/main" id="{3D79B3E5-D500-4756-BF6D-C0C74895E838}"/>
-              </a:ext>
-            </a:extLst>
-          </p:cNvPr>
-          <p:cNvSpPr>
-            <a:spLocks noGrp="1"/>
-          </p:cNvSpPr>
-          <p:nvPr>
-            <p:ph type="sldNum" sz="quarter" idx="12"/>
-          </p:nvPr>
-        </p:nvSpPr>
-        <p:spPr>
-          <a:xfrm>
-            <a:off x="10766796" y="6356351"/>
-            <a:ext cx="609441" cy="365125"/>
-          </a:xfrm>
-        </p:spPr>
-        <p:txBody>
-          <a:bodyPr rtlCol="0"/>
-          <a:lstStyle/>
-          <a:p>
-            <a:pPr rtl="0"/>
-            <a:fld id="{7DC1BBB0-96F0-4077-A278-0F3FB5C104D3}" type="slidenum">
-              <a:rPr lang="de-DE"/>
-              <a:t>4</a:t>
-            </a:fld>
-            <a:endParaRPr lang="de-DE"/>
-          </a:p>
-        </p:txBody>
-      </p:sp>
     </p:spTree>
     <p:extLst>
       <p:ext uri="{BB962C8B-B14F-4D97-AF65-F5344CB8AC3E}">
@@ -8684,15 +8735,7 @@
           <a:p>
             <a:r>
               <a:rPr lang="de-DE" dirty="0"/>
-              <a:t>Farbe der </a:t>
-            </a:r>
-            <a:r>
-              <a:rPr lang="de-DE" dirty="0" err="1"/>
-              <a:t>Mouseposition</a:t>
-            </a:r>
-            <a:r>
-              <a:rPr lang="de-DE" dirty="0"/>
-              <a:t> wird gelesen, ist es keine der </a:t>
+              <a:t>Farbe der Mouse-Position wird gelesen, ist es keine der </a:t>
             </a:r>
             <a:br>
               <a:rPr lang="de-DE" dirty="0"/>
@@ -8747,7 +8790,7 @@
           <a:graphicData uri="http://schemas.openxmlformats.org/presentationml/2006/ole">
             <mc:AlternateContent xmlns:mc="http://schemas.openxmlformats.org/markup-compatibility/2006">
               <mc:Choice xmlns:v="urn:schemas-microsoft-com:vml" Requires="v">
-                <p:oleObj spid="_x0000_s8203" r:id="rId4" imgW="3720600" imgH="1383840" progId="">
+                <p:oleObj spid="_x0000_s8208" r:id="rId4" imgW="3720600" imgH="1383840" progId="">
                   <p:embed/>
                 </p:oleObj>
               </mc:Choice>
@@ -8788,93 +8831,6 @@
           </a:graphicData>
         </a:graphic>
       </p:graphicFrame>
-      <p:sp>
-        <p:nvSpPr>
-          <p:cNvPr id="5" name="Foliennummernplatzhalter 5">
-            <a:extLst>
-              <a:ext uri="{FF2B5EF4-FFF2-40B4-BE49-F238E27FC236}">
-                <a16:creationId xmlns:a16="http://schemas.microsoft.com/office/drawing/2014/main" id="{3D79B3E5-D500-4756-BF6D-C0C74895E838}"/>
-              </a:ext>
-            </a:extLst>
-          </p:cNvPr>
-          <p:cNvSpPr>
-            <a:spLocks noGrp="1"/>
-          </p:cNvSpPr>
-          <p:nvPr>
-            <p:ph type="sldNum" sz="quarter" idx="12"/>
-          </p:nvPr>
-        </p:nvSpPr>
-        <p:spPr>
-          <a:xfrm>
-            <a:off x="10766796" y="6356351"/>
-            <a:ext cx="609441" cy="365125"/>
-          </a:xfrm>
-        </p:spPr>
-        <p:txBody>
-          <a:bodyPr rtlCol="0"/>
-          <a:lstStyle/>
-          <a:p>
-            <a:pPr rtl="0"/>
-            <a:fld id="{7DC1BBB0-96F0-4077-A278-0F3FB5C104D3}" type="slidenum">
-              <a:rPr lang="de-DE"/>
-              <a:t>5</a:t>
-            </a:fld>
-            <a:endParaRPr lang="de-DE"/>
-          </a:p>
-        </p:txBody>
-      </p:sp>
-      <p:sp>
-        <p:nvSpPr>
-          <p:cNvPr id="6" name="Rechteck 5">
-            <a:extLst>
-              <a:ext uri="{FF2B5EF4-FFF2-40B4-BE49-F238E27FC236}">
-                <a16:creationId xmlns:a16="http://schemas.microsoft.com/office/drawing/2014/main" id="{7E4DB7F4-0BF8-413D-8BA3-E6E5A3F2AB68}"/>
-              </a:ext>
-            </a:extLst>
-          </p:cNvPr>
-          <p:cNvSpPr/>
-          <p:nvPr/>
-        </p:nvSpPr>
-        <p:spPr bwMode="gray">
-          <a:xfrm>
-            <a:off x="625808" y="0"/>
-            <a:ext cx="644068" cy="6858000"/>
-          </a:xfrm>
-          <a:prstGeom prst="rect">
-            <a:avLst/>
-          </a:prstGeom>
-          <a:solidFill>
-            <a:srgbClr val="6A8093"/>
-          </a:solidFill>
-          <a:ln>
-            <a:noFill/>
-          </a:ln>
-        </p:spPr>
-        <p:style>
-          <a:lnRef idx="2">
-            <a:schemeClr val="accent1">
-              <a:shade val="50000"/>
-            </a:schemeClr>
-          </a:lnRef>
-          <a:fillRef idx="1">
-            <a:schemeClr val="accent1"/>
-          </a:fillRef>
-          <a:effectRef idx="0">
-            <a:schemeClr val="accent1"/>
-          </a:effectRef>
-          <a:fontRef idx="minor">
-            <a:schemeClr val="lt1"/>
-          </a:fontRef>
-        </p:style>
-        <p:txBody>
-          <a:bodyPr lIns="121899" tIns="60949" rIns="121899" bIns="60949" rtlCol="0" anchor="ctr"/>
-          <a:lstStyle/>
-          <a:p>
-            <a:pPr algn="ctr" rtl="0"/>
-            <a:endParaRPr lang="de-DE"/>
-          </a:p>
-        </p:txBody>
-      </p:sp>
     </p:spTree>
     <p:extLst>
       <p:ext uri="{BB962C8B-B14F-4D97-AF65-F5344CB8AC3E}">
@@ -8917,12 +8873,75 @@
           <a:chExt cx="0" cy="0"/>
         </a:xfrm>
       </p:grpSpPr>
+      <p:graphicFrame>
+        <p:nvGraphicFramePr>
+          <p:cNvPr id="8" name="Objekt 7">
+            <a:extLst>
+              <a:ext uri="{FF2B5EF4-FFF2-40B4-BE49-F238E27FC236}">
+                <a16:creationId xmlns:a16="http://schemas.microsoft.com/office/drawing/2014/main" id="{02D3B34F-D0F9-41E6-A9FB-9BCDEC7F7DC0}"/>
+              </a:ext>
+            </a:extLst>
+          </p:cNvPr>
+          <p:cNvGraphicFramePr>
+            <a:graphicFrameLocks noChangeAspect="1"/>
+          </p:cNvGraphicFramePr>
+          <p:nvPr/>
+        </p:nvGraphicFramePr>
+        <p:xfrm>
+          <a:off x="9702200" y="136524"/>
+          <a:ext cx="2129191" cy="792088"/>
+        </p:xfrm>
+        <a:graphic>
+          <a:graphicData uri="http://schemas.openxmlformats.org/presentationml/2006/ole">
+            <mc:AlternateContent xmlns:mc="http://schemas.openxmlformats.org/markup-compatibility/2006">
+              <mc:Choice xmlns:v="urn:schemas-microsoft-com:vml" Requires="v">
+                <p:oleObj spid="_x0000_s29702" r:id="rId4" imgW="3720600" imgH="1383840" progId="">
+                  <p:embed/>
+                </p:oleObj>
+              </mc:Choice>
+              <mc:Fallback>
+                <p:oleObj r:id="rId4" imgW="3720600" imgH="1383840" progId="">
+                  <p:embed/>
+                  <p:pic>
+                    <p:nvPicPr>
+                      <p:cNvPr id="8" name="Objekt 7">
+                        <a:extLst>
+                          <a:ext uri="{FF2B5EF4-FFF2-40B4-BE49-F238E27FC236}">
+                            <a16:creationId xmlns:a16="http://schemas.microsoft.com/office/drawing/2014/main" id="{02D3B34F-D0F9-41E6-A9FB-9BCDEC7F7DC0}"/>
+                          </a:ext>
+                        </a:extLst>
+                      </p:cNvPr>
+                      <p:cNvPicPr/>
+                      <p:nvPr/>
+                    </p:nvPicPr>
+                    <p:blipFill>
+                      <a:blip r:embed="rId5"/>
+                      <a:stretch>
+                        <a:fillRect/>
+                      </a:stretch>
+                    </p:blipFill>
+                    <p:spPr>
+                      <a:xfrm>
+                        <a:off x="9702200" y="136524"/>
+                        <a:ext cx="2129191" cy="792088"/>
+                      </a:xfrm>
+                      <a:prstGeom prst="rect">
+                        <a:avLst/>
+                      </a:prstGeom>
+                    </p:spPr>
+                  </p:pic>
+                </p:oleObj>
+              </mc:Fallback>
+            </mc:AlternateContent>
+          </a:graphicData>
+        </a:graphic>
+      </p:graphicFrame>
       <p:sp>
         <p:nvSpPr>
           <p:cNvPr id="4" name="Titel 3">
             <a:extLst>
               <a:ext uri="{FF2B5EF4-FFF2-40B4-BE49-F238E27FC236}">
-                <a16:creationId xmlns:a16="http://schemas.microsoft.com/office/drawing/2014/main" id="{5F276C15-D03E-43D3-A21E-BC22E0ABED34}"/>
+                <a16:creationId xmlns:a16="http://schemas.microsoft.com/office/drawing/2014/main" id="{5D9DE6FE-994A-4DFE-8D9C-69B4713E47DC}"/>
               </a:ext>
             </a:extLst>
           </p:cNvPr>
@@ -8935,15 +8954,14 @@
         </p:nvSpPr>
         <p:spPr>
           <a:xfrm>
-            <a:off x="2428669" y="1600201"/>
-            <a:ext cx="8329031" cy="1917700"/>
+            <a:off x="2428669" y="1600200"/>
+            <a:ext cx="8329031" cy="2680127"/>
           </a:xfrm>
         </p:spPr>
         <p:txBody>
           <a:bodyPr/>
           <a:lstStyle/>
           <a:p>
-            <a:pPr algn="ctr"/>
             <a:r>
               <a:rPr lang="de-AT" sz="4400" dirty="0">
                 <a:solidFill>
@@ -8957,18 +8975,708 @@
       </p:sp>
       <p:sp>
         <p:nvSpPr>
-          <p:cNvPr id="5" name="Foliennummernplatzhalter 5">
+          <p:cNvPr id="6" name="Datumsplatzhalter 3">
             <a:extLst>
               <a:ext uri="{FF2B5EF4-FFF2-40B4-BE49-F238E27FC236}">
-                <a16:creationId xmlns:a16="http://schemas.microsoft.com/office/drawing/2014/main" id="{3D79B3E5-D500-4756-BF6D-C0C74895E838}"/>
+                <a16:creationId xmlns:a16="http://schemas.microsoft.com/office/drawing/2014/main" id="{AC6361BD-84C1-4E5C-B05F-39A7484C191A}"/>
               </a:ext>
             </a:extLst>
           </p:cNvPr>
+          <p:cNvSpPr txBox="1">
+            <a:spLocks/>
+          </p:cNvSpPr>
+          <p:nvPr/>
+        </p:nvSpPr>
+        <p:spPr>
+          <a:xfrm>
+            <a:off x="5501520" y="6356351"/>
+            <a:ext cx="1218883" cy="365125"/>
+          </a:xfrm>
+          <a:prstGeom prst="rect">
+            <a:avLst/>
+          </a:prstGeom>
+        </p:spPr>
+        <p:txBody>
+          <a:bodyPr vert="horz" lIns="91440" tIns="45720" rIns="91440" bIns="45720" rtlCol="0" anchor="ctr"/>
+          <a:lstStyle>
+            <a:defPPr rtl="0">
+              <a:defRPr lang="de-de"/>
+            </a:defPPr>
+            <a:lvl1pPr marL="0" algn="l" defTabSz="914400" rtl="0" eaLnBrk="1" latinLnBrk="0" hangingPunct="1">
+              <a:defRPr sz="1200" kern="1200" cap="all" baseline="0">
+                <a:solidFill>
+                  <a:schemeClr val="tx2"/>
+                </a:solidFill>
+                <a:latin typeface="+mn-lt"/>
+                <a:ea typeface="+mn-ea"/>
+                <a:cs typeface="+mn-cs"/>
+              </a:defRPr>
+            </a:lvl1pPr>
+            <a:lvl2pPr marL="457200" algn="l" defTabSz="914400" rtl="0" eaLnBrk="1" latinLnBrk="0" hangingPunct="1">
+              <a:defRPr sz="1800" kern="1200">
+                <a:solidFill>
+                  <a:schemeClr val="tx1"/>
+                </a:solidFill>
+                <a:latin typeface="+mn-lt"/>
+                <a:ea typeface="+mn-ea"/>
+                <a:cs typeface="+mn-cs"/>
+              </a:defRPr>
+            </a:lvl2pPr>
+            <a:lvl3pPr marL="914400" algn="l" defTabSz="914400" rtl="0" eaLnBrk="1" latinLnBrk="0" hangingPunct="1">
+              <a:defRPr sz="1800" kern="1200">
+                <a:solidFill>
+                  <a:schemeClr val="tx1"/>
+                </a:solidFill>
+                <a:latin typeface="+mn-lt"/>
+                <a:ea typeface="+mn-ea"/>
+                <a:cs typeface="+mn-cs"/>
+              </a:defRPr>
+            </a:lvl3pPr>
+            <a:lvl4pPr marL="1371600" algn="l" defTabSz="914400" rtl="0" eaLnBrk="1" latinLnBrk="0" hangingPunct="1">
+              <a:defRPr sz="1800" kern="1200">
+                <a:solidFill>
+                  <a:schemeClr val="tx1"/>
+                </a:solidFill>
+                <a:latin typeface="+mn-lt"/>
+                <a:ea typeface="+mn-ea"/>
+                <a:cs typeface="+mn-cs"/>
+              </a:defRPr>
+            </a:lvl4pPr>
+            <a:lvl5pPr marL="1828800" algn="l" defTabSz="914400" rtl="0" eaLnBrk="1" latinLnBrk="0" hangingPunct="1">
+              <a:defRPr sz="1800" kern="1200">
+                <a:solidFill>
+                  <a:schemeClr val="tx1"/>
+                </a:solidFill>
+                <a:latin typeface="+mn-lt"/>
+                <a:ea typeface="+mn-ea"/>
+                <a:cs typeface="+mn-cs"/>
+              </a:defRPr>
+            </a:lvl5pPr>
+            <a:lvl6pPr marL="2286000" algn="l" defTabSz="914400" rtl="0" eaLnBrk="1" latinLnBrk="0" hangingPunct="1">
+              <a:defRPr sz="1800" kern="1200">
+                <a:solidFill>
+                  <a:schemeClr val="tx1"/>
+                </a:solidFill>
+                <a:latin typeface="+mn-lt"/>
+                <a:ea typeface="+mn-ea"/>
+                <a:cs typeface="+mn-cs"/>
+              </a:defRPr>
+            </a:lvl6pPr>
+            <a:lvl7pPr marL="2743200" algn="l" defTabSz="914400" rtl="0" eaLnBrk="1" latinLnBrk="0" hangingPunct="1">
+              <a:defRPr sz="1800" kern="1200">
+                <a:solidFill>
+                  <a:schemeClr val="tx1"/>
+                </a:solidFill>
+                <a:latin typeface="+mn-lt"/>
+                <a:ea typeface="+mn-ea"/>
+                <a:cs typeface="+mn-cs"/>
+              </a:defRPr>
+            </a:lvl7pPr>
+            <a:lvl8pPr marL="3200400" algn="l" defTabSz="914400" rtl="0" eaLnBrk="1" latinLnBrk="0" hangingPunct="1">
+              <a:defRPr sz="1800" kern="1200">
+                <a:solidFill>
+                  <a:schemeClr val="tx1"/>
+                </a:solidFill>
+                <a:latin typeface="+mn-lt"/>
+                <a:ea typeface="+mn-ea"/>
+                <a:cs typeface="+mn-cs"/>
+              </a:defRPr>
+            </a:lvl8pPr>
+            <a:lvl9pPr marL="3657600" algn="l" defTabSz="914400" rtl="0" eaLnBrk="1" latinLnBrk="0" hangingPunct="1">
+              <a:defRPr sz="1800" kern="1200">
+                <a:solidFill>
+                  <a:schemeClr val="tx1"/>
+                </a:solidFill>
+                <a:latin typeface="+mn-lt"/>
+                <a:ea typeface="+mn-ea"/>
+                <a:cs typeface="+mn-cs"/>
+              </a:defRPr>
+            </a:lvl9pPr>
+          </a:lstStyle>
+          <a:p>
+            <a:r>
+              <a:rPr lang="de-DE" dirty="0"/>
+              <a:t>19.12.2022</a:t>
+            </a:r>
+          </a:p>
+        </p:txBody>
+      </p:sp>
+      <p:sp>
+        <p:nvSpPr>
+          <p:cNvPr id="9" name="Fußzeilenplatzhalter 4">
+            <a:extLst>
+              <a:ext uri="{FF2B5EF4-FFF2-40B4-BE49-F238E27FC236}">
+                <a16:creationId xmlns:a16="http://schemas.microsoft.com/office/drawing/2014/main" id="{1BA700E4-D2F5-4489-AD67-F6630E17465C}"/>
+              </a:ext>
+            </a:extLst>
+          </p:cNvPr>
+          <p:cNvSpPr txBox="1">
+            <a:spLocks/>
+          </p:cNvSpPr>
+          <p:nvPr/>
+        </p:nvSpPr>
+        <p:spPr>
+          <a:xfrm>
+            <a:off x="6687305" y="6356351"/>
+            <a:ext cx="3974065" cy="365125"/>
+          </a:xfrm>
+          <a:prstGeom prst="rect">
+            <a:avLst/>
+          </a:prstGeom>
+        </p:spPr>
+        <p:txBody>
+          <a:bodyPr vert="horz" lIns="91440" tIns="45720" rIns="91440" bIns="45720" rtlCol="0" anchor="ctr"/>
+          <a:lstStyle>
+            <a:defPPr rtl="0">
+              <a:defRPr lang="de-de"/>
+            </a:defPPr>
+            <a:lvl1pPr marL="0" algn="ctr" defTabSz="914400" rtl="0" eaLnBrk="1" latinLnBrk="0" hangingPunct="1">
+              <a:defRPr sz="1200" b="1" kern="1200" cap="none" baseline="0">
+                <a:solidFill>
+                  <a:schemeClr val="tx2"/>
+                </a:solidFill>
+                <a:latin typeface="+mn-lt"/>
+                <a:ea typeface="+mn-ea"/>
+                <a:cs typeface="+mn-cs"/>
+              </a:defRPr>
+            </a:lvl1pPr>
+            <a:lvl2pPr marL="457200" algn="l" defTabSz="914400" rtl="0" eaLnBrk="1" latinLnBrk="0" hangingPunct="1">
+              <a:defRPr sz="1800" kern="1200">
+                <a:solidFill>
+                  <a:schemeClr val="tx1"/>
+                </a:solidFill>
+                <a:latin typeface="+mn-lt"/>
+                <a:ea typeface="+mn-ea"/>
+                <a:cs typeface="+mn-cs"/>
+              </a:defRPr>
+            </a:lvl2pPr>
+            <a:lvl3pPr marL="914400" algn="l" defTabSz="914400" rtl="0" eaLnBrk="1" latinLnBrk="0" hangingPunct="1">
+              <a:defRPr sz="1800" kern="1200">
+                <a:solidFill>
+                  <a:schemeClr val="tx1"/>
+                </a:solidFill>
+                <a:latin typeface="+mn-lt"/>
+                <a:ea typeface="+mn-ea"/>
+                <a:cs typeface="+mn-cs"/>
+              </a:defRPr>
+            </a:lvl3pPr>
+            <a:lvl4pPr marL="1371600" algn="l" defTabSz="914400" rtl="0" eaLnBrk="1" latinLnBrk="0" hangingPunct="1">
+              <a:defRPr sz="1800" kern="1200">
+                <a:solidFill>
+                  <a:schemeClr val="tx1"/>
+                </a:solidFill>
+                <a:latin typeface="+mn-lt"/>
+                <a:ea typeface="+mn-ea"/>
+                <a:cs typeface="+mn-cs"/>
+              </a:defRPr>
+            </a:lvl4pPr>
+            <a:lvl5pPr marL="1828800" algn="l" defTabSz="914400" rtl="0" eaLnBrk="1" latinLnBrk="0" hangingPunct="1">
+              <a:defRPr sz="1800" kern="1200">
+                <a:solidFill>
+                  <a:schemeClr val="tx1"/>
+                </a:solidFill>
+                <a:latin typeface="+mn-lt"/>
+                <a:ea typeface="+mn-ea"/>
+                <a:cs typeface="+mn-cs"/>
+              </a:defRPr>
+            </a:lvl5pPr>
+            <a:lvl6pPr marL="2286000" algn="l" defTabSz="914400" rtl="0" eaLnBrk="1" latinLnBrk="0" hangingPunct="1">
+              <a:defRPr sz="1800" kern="1200">
+                <a:solidFill>
+                  <a:schemeClr val="tx1"/>
+                </a:solidFill>
+                <a:latin typeface="+mn-lt"/>
+                <a:ea typeface="+mn-ea"/>
+                <a:cs typeface="+mn-cs"/>
+              </a:defRPr>
+            </a:lvl6pPr>
+            <a:lvl7pPr marL="2743200" algn="l" defTabSz="914400" rtl="0" eaLnBrk="1" latinLnBrk="0" hangingPunct="1">
+              <a:defRPr sz="1800" kern="1200">
+                <a:solidFill>
+                  <a:schemeClr val="tx1"/>
+                </a:solidFill>
+                <a:latin typeface="+mn-lt"/>
+                <a:ea typeface="+mn-ea"/>
+                <a:cs typeface="+mn-cs"/>
+              </a:defRPr>
+            </a:lvl7pPr>
+            <a:lvl8pPr marL="3200400" algn="l" defTabSz="914400" rtl="0" eaLnBrk="1" latinLnBrk="0" hangingPunct="1">
+              <a:defRPr sz="1800" kern="1200">
+                <a:solidFill>
+                  <a:schemeClr val="tx1"/>
+                </a:solidFill>
+                <a:latin typeface="+mn-lt"/>
+                <a:ea typeface="+mn-ea"/>
+                <a:cs typeface="+mn-cs"/>
+              </a:defRPr>
+            </a:lvl8pPr>
+            <a:lvl9pPr marL="3657600" algn="l" defTabSz="914400" rtl="0" eaLnBrk="1" latinLnBrk="0" hangingPunct="1">
+              <a:defRPr sz="1800" kern="1200">
+                <a:solidFill>
+                  <a:schemeClr val="tx1"/>
+                </a:solidFill>
+                <a:latin typeface="+mn-lt"/>
+                <a:ea typeface="+mn-ea"/>
+                <a:cs typeface="+mn-cs"/>
+              </a:defRPr>
+            </a:lvl9pPr>
+          </a:lstStyle>
+          <a:p>
+            <a:r>
+              <a:rPr lang="de-DE"/>
+              <a:t>Präsentation</a:t>
+            </a:r>
+          </a:p>
+        </p:txBody>
+      </p:sp>
+    </p:spTree>
+    <p:extLst>
+      <p:ext uri="{BB962C8B-B14F-4D97-AF65-F5344CB8AC3E}">
+        <p14:creationId xmlns:p14="http://schemas.microsoft.com/office/powerpoint/2010/main" val="3163010821"/>
+      </p:ext>
+    </p:extLst>
+  </p:cSld>
+  <p:clrMapOvr>
+    <a:masterClrMapping/>
+  </p:clrMapOvr>
+  <mc:AlternateContent xmlns:mc="http://schemas.openxmlformats.org/markup-compatibility/2006" xmlns:p14="http://schemas.microsoft.com/office/powerpoint/2010/main">
+    <mc:Choice Requires="p14">
+      <p:transition spd="med" p14:dur="700">
+        <p:fade/>
+      </p:transition>
+    </mc:Choice>
+    <mc:Fallback xmlns="">
+      <p:transition spd="med">
+        <p:fade/>
+      </p:transition>
+    </mc:Fallback>
+  </mc:AlternateContent>
+</p:sld>
+</file>
+
+<file path=ppt/slides/slide7.xml><?xml version="1.0" encoding="utf-8"?>
+<p:sld xmlns:a="http://schemas.openxmlformats.org/drawingml/2006/main" xmlns:r="http://schemas.openxmlformats.org/officeDocument/2006/relationships" xmlns:p="http://schemas.openxmlformats.org/presentationml/2006/main">
+  <p:cSld>
+    <p:spTree>
+      <p:nvGrpSpPr>
+        <p:cNvPr id="1" name=""/>
+        <p:cNvGrpSpPr/>
+        <p:nvPr/>
+      </p:nvGrpSpPr>
+      <p:grpSpPr>
+        <a:xfrm>
+          <a:off x="0" y="0"/>
+          <a:ext cx="0" cy="0"/>
+          <a:chOff x="0" y="0"/>
+          <a:chExt cx="0" cy="0"/>
+        </a:xfrm>
+      </p:grpSpPr>
+      <p:graphicFrame>
+        <p:nvGraphicFramePr>
+          <p:cNvPr id="8" name="Objekt 7">
+            <a:extLst>
+              <a:ext uri="{FF2B5EF4-FFF2-40B4-BE49-F238E27FC236}">
+                <a16:creationId xmlns:a16="http://schemas.microsoft.com/office/drawing/2014/main" id="{02D3B34F-D0F9-41E6-A9FB-9BCDEC7F7DC0}"/>
+              </a:ext>
+            </a:extLst>
+          </p:cNvPr>
+          <p:cNvGraphicFramePr>
+            <a:graphicFrameLocks noChangeAspect="1"/>
+          </p:cNvGraphicFramePr>
+          <p:nvPr/>
+        </p:nvGraphicFramePr>
+        <p:xfrm>
+          <a:off x="9702200" y="136524"/>
+          <a:ext cx="2129191" cy="792088"/>
+        </p:xfrm>
+        <a:graphic>
+          <a:graphicData uri="http://schemas.openxmlformats.org/presentationml/2006/ole">
+            <mc:AlternateContent xmlns:mc="http://schemas.openxmlformats.org/markup-compatibility/2006">
+              <mc:Choice xmlns:v="urn:schemas-microsoft-com:vml" Requires="v">
+                <p:oleObj spid="_x0000_s30726" r:id="rId4" imgW="3720600" imgH="1383840" progId="">
+                  <p:embed/>
+                </p:oleObj>
+              </mc:Choice>
+              <mc:Fallback>
+                <p:oleObj r:id="rId4" imgW="3720600" imgH="1383840" progId="">
+                  <p:embed/>
+                  <p:pic>
+                    <p:nvPicPr>
+                      <p:cNvPr id="8" name="Objekt 7">
+                        <a:extLst>
+                          <a:ext uri="{FF2B5EF4-FFF2-40B4-BE49-F238E27FC236}">
+                            <a16:creationId xmlns:a16="http://schemas.microsoft.com/office/drawing/2014/main" id="{02D3B34F-D0F9-41E6-A9FB-9BCDEC7F7DC0}"/>
+                          </a:ext>
+                        </a:extLst>
+                      </p:cNvPr>
+                      <p:cNvPicPr/>
+                      <p:nvPr/>
+                    </p:nvPicPr>
+                    <p:blipFill>
+                      <a:blip r:embed="rId5"/>
+                      <a:stretch>
+                        <a:fillRect/>
+                      </a:stretch>
+                    </p:blipFill>
+                    <p:spPr>
+                      <a:xfrm>
+                        <a:off x="9702200" y="136524"/>
+                        <a:ext cx="2129191" cy="792088"/>
+                      </a:xfrm>
+                      <a:prstGeom prst="rect">
+                        <a:avLst/>
+                      </a:prstGeom>
+                    </p:spPr>
+                  </p:pic>
+                </p:oleObj>
+              </mc:Fallback>
+            </mc:AlternateContent>
+          </a:graphicData>
+        </a:graphic>
+      </p:graphicFrame>
+      <p:sp>
+        <p:nvSpPr>
+          <p:cNvPr id="4" name="Titel 3">
+            <a:extLst>
+              <a:ext uri="{FF2B5EF4-FFF2-40B4-BE49-F238E27FC236}">
+                <a16:creationId xmlns:a16="http://schemas.microsoft.com/office/drawing/2014/main" id="{70825C60-FFA5-430C-BB70-4D84E4F9EAD8}"/>
+              </a:ext>
+            </a:extLst>
+          </p:cNvPr>
           <p:cNvSpPr>
             <a:spLocks noGrp="1"/>
           </p:cNvSpPr>
           <p:nvPr>
-            <p:ph type="sldNum" sz="quarter" idx="12"/>
+            <p:ph type="ctrTitle"/>
+          </p:nvPr>
+        </p:nvSpPr>
+        <p:spPr>
+          <a:xfrm>
+            <a:off x="2428669" y="1600201"/>
+            <a:ext cx="8329031" cy="2666999"/>
+          </a:xfrm>
+        </p:spPr>
+        <p:txBody>
+          <a:bodyPr/>
+          <a:lstStyle/>
+          <a:p>
+            <a:r>
+              <a:rPr lang="de-AT" sz="4400" dirty="0">
+                <a:solidFill>
+                  <a:srgbClr val="982348"/>
+                </a:solidFill>
+              </a:rPr>
+              <a:t>Architektur</a:t>
+            </a:r>
+          </a:p>
+        </p:txBody>
+      </p:sp>
+      <p:sp>
+        <p:nvSpPr>
+          <p:cNvPr id="6" name="Datumsplatzhalter 3">
+            <a:extLst>
+              <a:ext uri="{FF2B5EF4-FFF2-40B4-BE49-F238E27FC236}">
+                <a16:creationId xmlns:a16="http://schemas.microsoft.com/office/drawing/2014/main" id="{73ADAB98-666B-4328-B81C-B82692DBC037}"/>
+              </a:ext>
+            </a:extLst>
+          </p:cNvPr>
+          <p:cNvSpPr txBox="1">
+            <a:spLocks/>
+          </p:cNvSpPr>
+          <p:nvPr/>
+        </p:nvSpPr>
+        <p:spPr>
+          <a:xfrm>
+            <a:off x="5501520" y="6356351"/>
+            <a:ext cx="1218883" cy="365125"/>
+          </a:xfrm>
+          <a:prstGeom prst="rect">
+            <a:avLst/>
+          </a:prstGeom>
+        </p:spPr>
+        <p:txBody>
+          <a:bodyPr vert="horz" lIns="91440" tIns="45720" rIns="91440" bIns="45720" rtlCol="0" anchor="ctr"/>
+          <a:lstStyle>
+            <a:defPPr rtl="0">
+              <a:defRPr lang="de-de"/>
+            </a:defPPr>
+            <a:lvl1pPr marL="0" algn="l" defTabSz="914400" rtl="0" eaLnBrk="1" latinLnBrk="0" hangingPunct="1">
+              <a:defRPr sz="1200" kern="1200" cap="all" baseline="0">
+                <a:solidFill>
+                  <a:schemeClr val="tx2"/>
+                </a:solidFill>
+                <a:latin typeface="+mn-lt"/>
+                <a:ea typeface="+mn-ea"/>
+                <a:cs typeface="+mn-cs"/>
+              </a:defRPr>
+            </a:lvl1pPr>
+            <a:lvl2pPr marL="457200" algn="l" defTabSz="914400" rtl="0" eaLnBrk="1" latinLnBrk="0" hangingPunct="1">
+              <a:defRPr sz="1800" kern="1200">
+                <a:solidFill>
+                  <a:schemeClr val="tx1"/>
+                </a:solidFill>
+                <a:latin typeface="+mn-lt"/>
+                <a:ea typeface="+mn-ea"/>
+                <a:cs typeface="+mn-cs"/>
+              </a:defRPr>
+            </a:lvl2pPr>
+            <a:lvl3pPr marL="914400" algn="l" defTabSz="914400" rtl="0" eaLnBrk="1" latinLnBrk="0" hangingPunct="1">
+              <a:defRPr sz="1800" kern="1200">
+                <a:solidFill>
+                  <a:schemeClr val="tx1"/>
+                </a:solidFill>
+                <a:latin typeface="+mn-lt"/>
+                <a:ea typeface="+mn-ea"/>
+                <a:cs typeface="+mn-cs"/>
+              </a:defRPr>
+            </a:lvl3pPr>
+            <a:lvl4pPr marL="1371600" algn="l" defTabSz="914400" rtl="0" eaLnBrk="1" latinLnBrk="0" hangingPunct="1">
+              <a:defRPr sz="1800" kern="1200">
+                <a:solidFill>
+                  <a:schemeClr val="tx1"/>
+                </a:solidFill>
+                <a:latin typeface="+mn-lt"/>
+                <a:ea typeface="+mn-ea"/>
+                <a:cs typeface="+mn-cs"/>
+              </a:defRPr>
+            </a:lvl4pPr>
+            <a:lvl5pPr marL="1828800" algn="l" defTabSz="914400" rtl="0" eaLnBrk="1" latinLnBrk="0" hangingPunct="1">
+              <a:defRPr sz="1800" kern="1200">
+                <a:solidFill>
+                  <a:schemeClr val="tx1"/>
+                </a:solidFill>
+                <a:latin typeface="+mn-lt"/>
+                <a:ea typeface="+mn-ea"/>
+                <a:cs typeface="+mn-cs"/>
+              </a:defRPr>
+            </a:lvl5pPr>
+            <a:lvl6pPr marL="2286000" algn="l" defTabSz="914400" rtl="0" eaLnBrk="1" latinLnBrk="0" hangingPunct="1">
+              <a:defRPr sz="1800" kern="1200">
+                <a:solidFill>
+                  <a:schemeClr val="tx1"/>
+                </a:solidFill>
+                <a:latin typeface="+mn-lt"/>
+                <a:ea typeface="+mn-ea"/>
+                <a:cs typeface="+mn-cs"/>
+              </a:defRPr>
+            </a:lvl6pPr>
+            <a:lvl7pPr marL="2743200" algn="l" defTabSz="914400" rtl="0" eaLnBrk="1" latinLnBrk="0" hangingPunct="1">
+              <a:defRPr sz="1800" kern="1200">
+                <a:solidFill>
+                  <a:schemeClr val="tx1"/>
+                </a:solidFill>
+                <a:latin typeface="+mn-lt"/>
+                <a:ea typeface="+mn-ea"/>
+                <a:cs typeface="+mn-cs"/>
+              </a:defRPr>
+            </a:lvl7pPr>
+            <a:lvl8pPr marL="3200400" algn="l" defTabSz="914400" rtl="0" eaLnBrk="1" latinLnBrk="0" hangingPunct="1">
+              <a:defRPr sz="1800" kern="1200">
+                <a:solidFill>
+                  <a:schemeClr val="tx1"/>
+                </a:solidFill>
+                <a:latin typeface="+mn-lt"/>
+                <a:ea typeface="+mn-ea"/>
+                <a:cs typeface="+mn-cs"/>
+              </a:defRPr>
+            </a:lvl8pPr>
+            <a:lvl9pPr marL="3657600" algn="l" defTabSz="914400" rtl="0" eaLnBrk="1" latinLnBrk="0" hangingPunct="1">
+              <a:defRPr sz="1800" kern="1200">
+                <a:solidFill>
+                  <a:schemeClr val="tx1"/>
+                </a:solidFill>
+                <a:latin typeface="+mn-lt"/>
+                <a:ea typeface="+mn-ea"/>
+                <a:cs typeface="+mn-cs"/>
+              </a:defRPr>
+            </a:lvl9pPr>
+          </a:lstStyle>
+          <a:p>
+            <a:r>
+              <a:rPr lang="de-DE" dirty="0"/>
+              <a:t>19.12.2022</a:t>
+            </a:r>
+          </a:p>
+        </p:txBody>
+      </p:sp>
+      <p:sp>
+        <p:nvSpPr>
+          <p:cNvPr id="9" name="Fußzeilenplatzhalter 4">
+            <a:extLst>
+              <a:ext uri="{FF2B5EF4-FFF2-40B4-BE49-F238E27FC236}">
+                <a16:creationId xmlns:a16="http://schemas.microsoft.com/office/drawing/2014/main" id="{5EB75669-7DC3-4C3F-B48F-DEB356842ABD}"/>
+              </a:ext>
+            </a:extLst>
+          </p:cNvPr>
+          <p:cNvSpPr txBox="1">
+            <a:spLocks/>
+          </p:cNvSpPr>
+          <p:nvPr/>
+        </p:nvSpPr>
+        <p:spPr>
+          <a:xfrm>
+            <a:off x="6687305" y="6356351"/>
+            <a:ext cx="3974065" cy="365125"/>
+          </a:xfrm>
+          <a:prstGeom prst="rect">
+            <a:avLst/>
+          </a:prstGeom>
+        </p:spPr>
+        <p:txBody>
+          <a:bodyPr vert="horz" lIns="91440" tIns="45720" rIns="91440" bIns="45720" rtlCol="0" anchor="ctr"/>
+          <a:lstStyle>
+            <a:defPPr rtl="0">
+              <a:defRPr lang="de-de"/>
+            </a:defPPr>
+            <a:lvl1pPr marL="0" algn="ctr" defTabSz="914400" rtl="0" eaLnBrk="1" latinLnBrk="0" hangingPunct="1">
+              <a:defRPr sz="1200" b="1" kern="1200" cap="none" baseline="0">
+                <a:solidFill>
+                  <a:schemeClr val="tx2"/>
+                </a:solidFill>
+                <a:latin typeface="+mn-lt"/>
+                <a:ea typeface="+mn-ea"/>
+                <a:cs typeface="+mn-cs"/>
+              </a:defRPr>
+            </a:lvl1pPr>
+            <a:lvl2pPr marL="457200" algn="l" defTabSz="914400" rtl="0" eaLnBrk="1" latinLnBrk="0" hangingPunct="1">
+              <a:defRPr sz="1800" kern="1200">
+                <a:solidFill>
+                  <a:schemeClr val="tx1"/>
+                </a:solidFill>
+                <a:latin typeface="+mn-lt"/>
+                <a:ea typeface="+mn-ea"/>
+                <a:cs typeface="+mn-cs"/>
+              </a:defRPr>
+            </a:lvl2pPr>
+            <a:lvl3pPr marL="914400" algn="l" defTabSz="914400" rtl="0" eaLnBrk="1" latinLnBrk="0" hangingPunct="1">
+              <a:defRPr sz="1800" kern="1200">
+                <a:solidFill>
+                  <a:schemeClr val="tx1"/>
+                </a:solidFill>
+                <a:latin typeface="+mn-lt"/>
+                <a:ea typeface="+mn-ea"/>
+                <a:cs typeface="+mn-cs"/>
+              </a:defRPr>
+            </a:lvl3pPr>
+            <a:lvl4pPr marL="1371600" algn="l" defTabSz="914400" rtl="0" eaLnBrk="1" latinLnBrk="0" hangingPunct="1">
+              <a:defRPr sz="1800" kern="1200">
+                <a:solidFill>
+                  <a:schemeClr val="tx1"/>
+                </a:solidFill>
+                <a:latin typeface="+mn-lt"/>
+                <a:ea typeface="+mn-ea"/>
+                <a:cs typeface="+mn-cs"/>
+              </a:defRPr>
+            </a:lvl4pPr>
+            <a:lvl5pPr marL="1828800" algn="l" defTabSz="914400" rtl="0" eaLnBrk="1" latinLnBrk="0" hangingPunct="1">
+              <a:defRPr sz="1800" kern="1200">
+                <a:solidFill>
+                  <a:schemeClr val="tx1"/>
+                </a:solidFill>
+                <a:latin typeface="+mn-lt"/>
+                <a:ea typeface="+mn-ea"/>
+                <a:cs typeface="+mn-cs"/>
+              </a:defRPr>
+            </a:lvl5pPr>
+            <a:lvl6pPr marL="2286000" algn="l" defTabSz="914400" rtl="0" eaLnBrk="1" latinLnBrk="0" hangingPunct="1">
+              <a:defRPr sz="1800" kern="1200">
+                <a:solidFill>
+                  <a:schemeClr val="tx1"/>
+                </a:solidFill>
+                <a:latin typeface="+mn-lt"/>
+                <a:ea typeface="+mn-ea"/>
+                <a:cs typeface="+mn-cs"/>
+              </a:defRPr>
+            </a:lvl6pPr>
+            <a:lvl7pPr marL="2743200" algn="l" defTabSz="914400" rtl="0" eaLnBrk="1" latinLnBrk="0" hangingPunct="1">
+              <a:defRPr sz="1800" kern="1200">
+                <a:solidFill>
+                  <a:schemeClr val="tx1"/>
+                </a:solidFill>
+                <a:latin typeface="+mn-lt"/>
+                <a:ea typeface="+mn-ea"/>
+                <a:cs typeface="+mn-cs"/>
+              </a:defRPr>
+            </a:lvl7pPr>
+            <a:lvl8pPr marL="3200400" algn="l" defTabSz="914400" rtl="0" eaLnBrk="1" latinLnBrk="0" hangingPunct="1">
+              <a:defRPr sz="1800" kern="1200">
+                <a:solidFill>
+                  <a:schemeClr val="tx1"/>
+                </a:solidFill>
+                <a:latin typeface="+mn-lt"/>
+                <a:ea typeface="+mn-ea"/>
+                <a:cs typeface="+mn-cs"/>
+              </a:defRPr>
+            </a:lvl8pPr>
+            <a:lvl9pPr marL="3657600" algn="l" defTabSz="914400" rtl="0" eaLnBrk="1" latinLnBrk="0" hangingPunct="1">
+              <a:defRPr sz="1800" kern="1200">
+                <a:solidFill>
+                  <a:schemeClr val="tx1"/>
+                </a:solidFill>
+                <a:latin typeface="+mn-lt"/>
+                <a:ea typeface="+mn-ea"/>
+                <a:cs typeface="+mn-cs"/>
+              </a:defRPr>
+            </a:lvl9pPr>
+          </a:lstStyle>
+          <a:p>
+            <a:r>
+              <a:rPr lang="de-DE"/>
+              <a:t>Präsentation</a:t>
+            </a:r>
+          </a:p>
+        </p:txBody>
+      </p:sp>
+    </p:spTree>
+    <p:extLst>
+      <p:ext uri="{BB962C8B-B14F-4D97-AF65-F5344CB8AC3E}">
+        <p14:creationId xmlns:p14="http://schemas.microsoft.com/office/powerpoint/2010/main" val="4017421288"/>
+      </p:ext>
+    </p:extLst>
+  </p:cSld>
+  <p:clrMapOvr>
+    <a:masterClrMapping/>
+  </p:clrMapOvr>
+  <mc:AlternateContent xmlns:mc="http://schemas.openxmlformats.org/markup-compatibility/2006" xmlns:p14="http://schemas.microsoft.com/office/powerpoint/2010/main">
+    <mc:Choice Requires="p14">
+      <p:transition spd="med" p14:dur="700">
+        <p:fade/>
+      </p:transition>
+    </mc:Choice>
+    <mc:Fallback xmlns="">
+      <p:transition spd="med">
+        <p:fade/>
+      </p:transition>
+    </mc:Fallback>
+  </mc:AlternateContent>
+</p:sld>
+</file>
+
+<file path=ppt/slides/slide8.xml><?xml version="1.0" encoding="utf-8"?>
+<p:sld xmlns:a="http://schemas.openxmlformats.org/drawingml/2006/main" xmlns:r="http://schemas.openxmlformats.org/officeDocument/2006/relationships" xmlns:p="http://schemas.openxmlformats.org/presentationml/2006/main">
+  <p:cSld>
+    <p:spTree>
+      <p:nvGrpSpPr>
+        <p:cNvPr id="1" name=""/>
+        <p:cNvGrpSpPr/>
+        <p:nvPr/>
+      </p:nvGrpSpPr>
+      <p:grpSpPr>
+        <a:xfrm>
+          <a:off x="0" y="0"/>
+          <a:ext cx="0" cy="0"/>
+          <a:chOff x="0" y="0"/>
+          <a:chExt cx="0" cy="0"/>
+        </a:xfrm>
+      </p:grpSpPr>
+      <p:sp>
+        <p:nvSpPr>
+          <p:cNvPr id="13" name="Titel 12"/>
+          <p:cNvSpPr>
+            <a:spLocks noGrp="1"/>
+          </p:cNvSpPr>
+          <p:nvPr>
+            <p:ph type="title"/>
           </p:nvPr>
         </p:nvSpPr>
         <p:spPr/>
@@ -8976,12 +9684,58 @@
           <a:bodyPr rtlCol="0"/>
           <a:lstStyle/>
           <a:p>
-            <a:pPr rtl="0"/>
-            <a:fld id="{7DC1BBB0-96F0-4077-A278-0F3FB5C104D3}" type="slidenum">
-              <a:rPr lang="de-DE"/>
-              <a:t>6</a:t>
-            </a:fld>
-            <a:endParaRPr lang="de-DE"/>
+            <a:r>
+              <a:rPr lang="de-DE" dirty="0">
+                <a:solidFill>
+                  <a:srgbClr val="982348"/>
+                </a:solidFill>
+              </a:rPr>
+              <a:t>Software Architektur</a:t>
+            </a:r>
+          </a:p>
+        </p:txBody>
+      </p:sp>
+      <p:sp>
+        <p:nvSpPr>
+          <p:cNvPr id="14" name="Inhaltsplatzhalter 13"/>
+          <p:cNvSpPr>
+            <a:spLocks noGrp="1"/>
+          </p:cNvSpPr>
+          <p:nvPr>
+            <p:ph idx="1"/>
+          </p:nvPr>
+        </p:nvSpPr>
+        <p:spPr/>
+        <p:txBody>
+          <a:bodyPr vert="horz" lIns="91440" tIns="45720" rIns="91440" bIns="45720" rtlCol="0" anchor="t">
+            <a:normAutofit/>
+          </a:bodyPr>
+          <a:lstStyle/>
+          <a:p>
+            <a:pPr marL="0" indent="0" rtl="0">
+              <a:buNone/>
+            </a:pPr>
+            <a:endParaRPr lang="de-DE" dirty="0"/>
+          </a:p>
+          <a:p>
+            <a:pPr marL="246380" indent="-246380" rtl="0"/>
+            <a:endParaRPr lang="de-DE" dirty="0"/>
+          </a:p>
+          <a:p>
+            <a:pPr marL="0" indent="0" rtl="0">
+              <a:buNone/>
+            </a:pPr>
+            <a:endParaRPr lang="de-DE" dirty="0"/>
+          </a:p>
+          <a:p>
+            <a:pPr marL="246380" indent="-246380" rtl="0"/>
+            <a:endParaRPr lang="de-DE" dirty="0"/>
+          </a:p>
+          <a:p>
+            <a:pPr marL="0" indent="0" rtl="0">
+              <a:buNone/>
+            </a:pPr>
+            <a:endParaRPr lang="de-DE" dirty="0"/>
           </a:p>
         </p:txBody>
       </p:sp>
@@ -9007,7 +9761,7 @@
           <a:graphicData uri="http://schemas.openxmlformats.org/presentationml/2006/ole">
             <mc:AlternateContent xmlns:mc="http://schemas.openxmlformats.org/markup-compatibility/2006">
               <mc:Choice xmlns:v="urn:schemas-microsoft-com:vml" Requires="v">
-                <p:oleObj spid="_x0000_s22539" r:id="rId4" imgW="3720600" imgH="1383840" progId="">
+                <p:oleObj spid="_x0000_s11280" r:id="rId4" imgW="3720600" imgH="1383840" progId="">
                   <p:embed/>
                 </p:oleObj>
               </mc:Choice>
@@ -9048,493 +9802,6 @@
           </a:graphicData>
         </a:graphic>
       </p:graphicFrame>
-      <p:sp>
-        <p:nvSpPr>
-          <p:cNvPr id="6" name="Rechteck 5">
-            <a:extLst>
-              <a:ext uri="{FF2B5EF4-FFF2-40B4-BE49-F238E27FC236}">
-                <a16:creationId xmlns:a16="http://schemas.microsoft.com/office/drawing/2014/main" id="{7E4DB7F4-0BF8-413D-8BA3-E6E5A3F2AB68}"/>
-              </a:ext>
-            </a:extLst>
-          </p:cNvPr>
-          <p:cNvSpPr/>
-          <p:nvPr/>
-        </p:nvSpPr>
-        <p:spPr bwMode="gray">
-          <a:xfrm>
-            <a:off x="625808" y="0"/>
-            <a:ext cx="644068" cy="6858000"/>
-          </a:xfrm>
-          <a:prstGeom prst="rect">
-            <a:avLst/>
-          </a:prstGeom>
-          <a:solidFill>
-            <a:srgbClr val="6A8093"/>
-          </a:solidFill>
-          <a:ln>
-            <a:noFill/>
-          </a:ln>
-        </p:spPr>
-        <p:style>
-          <a:lnRef idx="2">
-            <a:schemeClr val="accent1">
-              <a:shade val="50000"/>
-            </a:schemeClr>
-          </a:lnRef>
-          <a:fillRef idx="1">
-            <a:schemeClr val="accent1"/>
-          </a:fillRef>
-          <a:effectRef idx="0">
-            <a:schemeClr val="accent1"/>
-          </a:effectRef>
-          <a:fontRef idx="minor">
-            <a:schemeClr val="lt1"/>
-          </a:fontRef>
-        </p:style>
-        <p:txBody>
-          <a:bodyPr lIns="121899" tIns="60949" rIns="121899" bIns="60949" rtlCol="0" anchor="ctr"/>
-          <a:lstStyle/>
-          <a:p>
-            <a:pPr algn="ctr" rtl="0"/>
-            <a:endParaRPr lang="de-DE"/>
-          </a:p>
-        </p:txBody>
-      </p:sp>
-    </p:spTree>
-    <p:extLst>
-      <p:ext uri="{BB962C8B-B14F-4D97-AF65-F5344CB8AC3E}">
-        <p14:creationId xmlns:p14="http://schemas.microsoft.com/office/powerpoint/2010/main" val="496984670"/>
-      </p:ext>
-    </p:extLst>
-  </p:cSld>
-  <p:clrMapOvr>
-    <a:masterClrMapping/>
-  </p:clrMapOvr>
-  <mc:AlternateContent xmlns:mc="http://schemas.openxmlformats.org/markup-compatibility/2006">
-    <mc:Choice xmlns:p14="http://schemas.microsoft.com/office/powerpoint/2010/main" Requires="p14">
-      <p:transition spd="med" p14:dur="700">
-        <p:fade/>
-      </p:transition>
-    </mc:Choice>
-    <mc:Fallback>
-      <p:transition spd="med">
-        <p:fade/>
-      </p:transition>
-    </mc:Fallback>
-  </mc:AlternateContent>
-</p:sld>
-</file>
-
-<file path=ppt/slides/slide7.xml><?xml version="1.0" encoding="utf-8"?>
-<p:sld xmlns:a="http://schemas.openxmlformats.org/drawingml/2006/main" xmlns:r="http://schemas.openxmlformats.org/officeDocument/2006/relationships" xmlns:p="http://schemas.openxmlformats.org/presentationml/2006/main">
-  <p:cSld>
-    <p:spTree>
-      <p:nvGrpSpPr>
-        <p:cNvPr id="1" name=""/>
-        <p:cNvGrpSpPr/>
-        <p:nvPr/>
-      </p:nvGrpSpPr>
-      <p:grpSpPr>
-        <a:xfrm>
-          <a:off x="0" y="0"/>
-          <a:ext cx="0" cy="0"/>
-          <a:chOff x="0" y="0"/>
-          <a:chExt cx="0" cy="0"/>
-        </a:xfrm>
-      </p:grpSpPr>
-      <p:sp>
-        <p:nvSpPr>
-          <p:cNvPr id="4" name="Titel 3">
-            <a:extLst>
-              <a:ext uri="{FF2B5EF4-FFF2-40B4-BE49-F238E27FC236}">
-                <a16:creationId xmlns:a16="http://schemas.microsoft.com/office/drawing/2014/main" id="{5F276C15-D03E-43D3-A21E-BC22E0ABED34}"/>
-              </a:ext>
-            </a:extLst>
-          </p:cNvPr>
-          <p:cNvSpPr>
-            <a:spLocks noGrp="1"/>
-          </p:cNvSpPr>
-          <p:nvPr>
-            <p:ph type="ctrTitle"/>
-          </p:nvPr>
-        </p:nvSpPr>
-        <p:spPr>
-          <a:xfrm>
-            <a:off x="2428669" y="1600201"/>
-            <a:ext cx="8329031" cy="1917700"/>
-          </a:xfrm>
-        </p:spPr>
-        <p:txBody>
-          <a:bodyPr/>
-          <a:lstStyle/>
-          <a:p>
-            <a:pPr algn="ctr"/>
-            <a:r>
-              <a:rPr lang="de-AT" sz="4400" dirty="0">
-                <a:solidFill>
-                  <a:srgbClr val="982348"/>
-                </a:solidFill>
-              </a:rPr>
-              <a:t>Architektur</a:t>
-            </a:r>
-          </a:p>
-        </p:txBody>
-      </p:sp>
-      <p:sp>
-        <p:nvSpPr>
-          <p:cNvPr id="5" name="Foliennummernplatzhalter 5">
-            <a:extLst>
-              <a:ext uri="{FF2B5EF4-FFF2-40B4-BE49-F238E27FC236}">
-                <a16:creationId xmlns:a16="http://schemas.microsoft.com/office/drawing/2014/main" id="{3D79B3E5-D500-4756-BF6D-C0C74895E838}"/>
-              </a:ext>
-            </a:extLst>
-          </p:cNvPr>
-          <p:cNvSpPr>
-            <a:spLocks noGrp="1"/>
-          </p:cNvSpPr>
-          <p:nvPr>
-            <p:ph type="sldNum" sz="quarter" idx="12"/>
-          </p:nvPr>
-        </p:nvSpPr>
-        <p:spPr/>
-        <p:txBody>
-          <a:bodyPr rtlCol="0"/>
-          <a:lstStyle/>
-          <a:p>
-            <a:pPr rtl="0"/>
-            <a:fld id="{7DC1BBB0-96F0-4077-A278-0F3FB5C104D3}" type="slidenum">
-              <a:rPr lang="de-DE"/>
-              <a:t>7</a:t>
-            </a:fld>
-            <a:endParaRPr lang="de-DE"/>
-          </a:p>
-        </p:txBody>
-      </p:sp>
-      <p:graphicFrame>
-        <p:nvGraphicFramePr>
-          <p:cNvPr id="7" name="Objekt 6">
-            <a:extLst>
-              <a:ext uri="{FF2B5EF4-FFF2-40B4-BE49-F238E27FC236}">
-                <a16:creationId xmlns:a16="http://schemas.microsoft.com/office/drawing/2014/main" id="{00ADAD02-CF42-4526-AFC8-3D47C39E9F67}"/>
-              </a:ext>
-            </a:extLst>
-          </p:cNvPr>
-          <p:cNvGraphicFramePr>
-            <a:graphicFrameLocks noChangeAspect="1"/>
-          </p:cNvGraphicFramePr>
-          <p:nvPr/>
-        </p:nvGraphicFramePr>
-        <p:xfrm>
-          <a:off x="9702200" y="136524"/>
-          <a:ext cx="2129191" cy="792088"/>
-        </p:xfrm>
-        <a:graphic>
-          <a:graphicData uri="http://schemas.openxmlformats.org/presentationml/2006/ole">
-            <mc:AlternateContent xmlns:mc="http://schemas.openxmlformats.org/markup-compatibility/2006">
-              <mc:Choice xmlns:v="urn:schemas-microsoft-com:vml" Requires="v">
-                <p:oleObj spid="_x0000_s25607" r:id="rId4" imgW="3720600" imgH="1383840" progId="">
-                  <p:embed/>
-                </p:oleObj>
-              </mc:Choice>
-              <mc:Fallback>
-                <p:oleObj r:id="rId4" imgW="3720600" imgH="1383840" progId="">
-                  <p:embed/>
-                  <p:pic>
-                    <p:nvPicPr>
-                      <p:cNvPr id="7" name="Objekt 6">
-                        <a:extLst>
-                          <a:ext uri="{FF2B5EF4-FFF2-40B4-BE49-F238E27FC236}">
-                            <a16:creationId xmlns:a16="http://schemas.microsoft.com/office/drawing/2014/main" id="{00ADAD02-CF42-4526-AFC8-3D47C39E9F67}"/>
-                          </a:ext>
-                        </a:extLst>
-                      </p:cNvPr>
-                      <p:cNvPicPr/>
-                      <p:nvPr/>
-                    </p:nvPicPr>
-                    <p:blipFill>
-                      <a:blip r:embed="rId5"/>
-                      <a:stretch>
-                        <a:fillRect/>
-                      </a:stretch>
-                    </p:blipFill>
-                    <p:spPr>
-                      <a:xfrm>
-                        <a:off x="9702200" y="136524"/>
-                        <a:ext cx="2129191" cy="792088"/>
-                      </a:xfrm>
-                      <a:prstGeom prst="rect">
-                        <a:avLst/>
-                      </a:prstGeom>
-                    </p:spPr>
-                  </p:pic>
-                </p:oleObj>
-              </mc:Fallback>
-            </mc:AlternateContent>
-          </a:graphicData>
-        </a:graphic>
-      </p:graphicFrame>
-      <p:sp>
-        <p:nvSpPr>
-          <p:cNvPr id="6" name="Rechteck 5">
-            <a:extLst>
-              <a:ext uri="{FF2B5EF4-FFF2-40B4-BE49-F238E27FC236}">
-                <a16:creationId xmlns:a16="http://schemas.microsoft.com/office/drawing/2014/main" id="{7E4DB7F4-0BF8-413D-8BA3-E6E5A3F2AB68}"/>
-              </a:ext>
-            </a:extLst>
-          </p:cNvPr>
-          <p:cNvSpPr/>
-          <p:nvPr/>
-        </p:nvSpPr>
-        <p:spPr bwMode="gray">
-          <a:xfrm>
-            <a:off x="625808" y="0"/>
-            <a:ext cx="644068" cy="6858000"/>
-          </a:xfrm>
-          <a:prstGeom prst="rect">
-            <a:avLst/>
-          </a:prstGeom>
-          <a:solidFill>
-            <a:srgbClr val="6A8093"/>
-          </a:solidFill>
-          <a:ln>
-            <a:noFill/>
-          </a:ln>
-        </p:spPr>
-        <p:style>
-          <a:lnRef idx="2">
-            <a:schemeClr val="accent1">
-              <a:shade val="50000"/>
-            </a:schemeClr>
-          </a:lnRef>
-          <a:fillRef idx="1">
-            <a:schemeClr val="accent1"/>
-          </a:fillRef>
-          <a:effectRef idx="0">
-            <a:schemeClr val="accent1"/>
-          </a:effectRef>
-          <a:fontRef idx="minor">
-            <a:schemeClr val="lt1"/>
-          </a:fontRef>
-        </p:style>
-        <p:txBody>
-          <a:bodyPr lIns="121899" tIns="60949" rIns="121899" bIns="60949" rtlCol="0" anchor="ctr"/>
-          <a:lstStyle/>
-          <a:p>
-            <a:pPr algn="ctr" rtl="0"/>
-            <a:endParaRPr lang="de-DE"/>
-          </a:p>
-        </p:txBody>
-      </p:sp>
-    </p:spTree>
-    <p:extLst>
-      <p:ext uri="{BB962C8B-B14F-4D97-AF65-F5344CB8AC3E}">
-        <p14:creationId xmlns:p14="http://schemas.microsoft.com/office/powerpoint/2010/main" val="1602285802"/>
-      </p:ext>
-    </p:extLst>
-  </p:cSld>
-  <p:clrMapOvr>
-    <a:masterClrMapping/>
-  </p:clrMapOvr>
-  <mc:AlternateContent xmlns:mc="http://schemas.openxmlformats.org/markup-compatibility/2006">
-    <mc:Choice xmlns:p14="http://schemas.microsoft.com/office/powerpoint/2010/main" Requires="p14">
-      <p:transition spd="med" p14:dur="700">
-        <p:fade/>
-      </p:transition>
-    </mc:Choice>
-    <mc:Fallback>
-      <p:transition spd="med">
-        <p:fade/>
-      </p:transition>
-    </mc:Fallback>
-  </mc:AlternateContent>
-</p:sld>
-</file>
-
-<file path=ppt/slides/slide8.xml><?xml version="1.0" encoding="utf-8"?>
-<p:sld xmlns:a="http://schemas.openxmlformats.org/drawingml/2006/main" xmlns:r="http://schemas.openxmlformats.org/officeDocument/2006/relationships" xmlns:p="http://schemas.openxmlformats.org/presentationml/2006/main">
-  <p:cSld>
-    <p:spTree>
-      <p:nvGrpSpPr>
-        <p:cNvPr id="1" name=""/>
-        <p:cNvGrpSpPr/>
-        <p:nvPr/>
-      </p:nvGrpSpPr>
-      <p:grpSpPr>
-        <a:xfrm>
-          <a:off x="0" y="0"/>
-          <a:ext cx="0" cy="0"/>
-          <a:chOff x="0" y="0"/>
-          <a:chExt cx="0" cy="0"/>
-        </a:xfrm>
-      </p:grpSpPr>
-      <p:sp>
-        <p:nvSpPr>
-          <p:cNvPr id="13" name="Titel 12"/>
-          <p:cNvSpPr>
-            <a:spLocks noGrp="1"/>
-          </p:cNvSpPr>
-          <p:nvPr>
-            <p:ph type="title"/>
-          </p:nvPr>
-        </p:nvSpPr>
-        <p:spPr/>
-        <p:txBody>
-          <a:bodyPr rtlCol="0"/>
-          <a:lstStyle/>
-          <a:p>
-            <a:r>
-              <a:rPr lang="de-DE" dirty="0">
-                <a:solidFill>
-                  <a:srgbClr val="982348"/>
-                </a:solidFill>
-              </a:rPr>
-              <a:t>Software Architektur</a:t>
-            </a:r>
-          </a:p>
-        </p:txBody>
-      </p:sp>
-      <p:sp>
-        <p:nvSpPr>
-          <p:cNvPr id="14" name="Inhaltsplatzhalter 13"/>
-          <p:cNvSpPr>
-            <a:spLocks noGrp="1"/>
-          </p:cNvSpPr>
-          <p:nvPr>
-            <p:ph idx="1"/>
-          </p:nvPr>
-        </p:nvSpPr>
-        <p:spPr/>
-        <p:txBody>
-          <a:bodyPr vert="horz" lIns="91440" tIns="45720" rIns="91440" bIns="45720" rtlCol="0" anchor="t">
-            <a:normAutofit/>
-          </a:bodyPr>
-          <a:lstStyle/>
-          <a:p>
-            <a:pPr marL="0" indent="0" rtl="0">
-              <a:buNone/>
-            </a:pPr>
-            <a:endParaRPr lang="de-DE" dirty="0"/>
-          </a:p>
-          <a:p>
-            <a:pPr marL="246380" indent="-246380" rtl="0"/>
-            <a:endParaRPr lang="de-DE" dirty="0"/>
-          </a:p>
-          <a:p>
-            <a:pPr marL="0" indent="0" rtl="0">
-              <a:buNone/>
-            </a:pPr>
-            <a:endParaRPr lang="de-DE" dirty="0"/>
-          </a:p>
-          <a:p>
-            <a:pPr marL="246380" indent="-246380" rtl="0"/>
-            <a:endParaRPr lang="de-DE" dirty="0"/>
-          </a:p>
-          <a:p>
-            <a:pPr marL="0" indent="0" rtl="0">
-              <a:buNone/>
-            </a:pPr>
-            <a:endParaRPr lang="de-DE" dirty="0"/>
-          </a:p>
-        </p:txBody>
-      </p:sp>
-      <p:graphicFrame>
-        <p:nvGraphicFramePr>
-          <p:cNvPr id="7" name="Objekt 6">
-            <a:extLst>
-              <a:ext uri="{FF2B5EF4-FFF2-40B4-BE49-F238E27FC236}">
-                <a16:creationId xmlns:a16="http://schemas.microsoft.com/office/drawing/2014/main" id="{00ADAD02-CF42-4526-AFC8-3D47C39E9F67}"/>
-              </a:ext>
-            </a:extLst>
-          </p:cNvPr>
-          <p:cNvGraphicFramePr>
-            <a:graphicFrameLocks noChangeAspect="1"/>
-          </p:cNvGraphicFramePr>
-          <p:nvPr/>
-        </p:nvGraphicFramePr>
-        <p:xfrm>
-          <a:off x="9702200" y="136524"/>
-          <a:ext cx="2129191" cy="792088"/>
-        </p:xfrm>
-        <a:graphic>
-          <a:graphicData uri="http://schemas.openxmlformats.org/presentationml/2006/ole">
-            <mc:AlternateContent xmlns:mc="http://schemas.openxmlformats.org/markup-compatibility/2006">
-              <mc:Choice xmlns:v="urn:schemas-microsoft-com:vml" Requires="v">
-                <p:oleObj spid="_x0000_s11275" r:id="rId4" imgW="3720600" imgH="1383840" progId="">
-                  <p:embed/>
-                </p:oleObj>
-              </mc:Choice>
-              <mc:Fallback>
-                <p:oleObj r:id="rId4" imgW="3720600" imgH="1383840" progId="">
-                  <p:embed/>
-                  <p:pic>
-                    <p:nvPicPr>
-                      <p:cNvPr id="7" name="Objekt 6">
-                        <a:extLst>
-                          <a:ext uri="{FF2B5EF4-FFF2-40B4-BE49-F238E27FC236}">
-                            <a16:creationId xmlns:a16="http://schemas.microsoft.com/office/drawing/2014/main" id="{00ADAD02-CF42-4526-AFC8-3D47C39E9F67}"/>
-                          </a:ext>
-                        </a:extLst>
-                      </p:cNvPr>
-                      <p:cNvPicPr/>
-                      <p:nvPr/>
-                    </p:nvPicPr>
-                    <p:blipFill>
-                      <a:blip r:embed="rId5"/>
-                      <a:stretch>
-                        <a:fillRect/>
-                      </a:stretch>
-                    </p:blipFill>
-                    <p:spPr>
-                      <a:xfrm>
-                        <a:off x="9702200" y="136524"/>
-                        <a:ext cx="2129191" cy="792088"/>
-                      </a:xfrm>
-                      <a:prstGeom prst="rect">
-                        <a:avLst/>
-                      </a:prstGeom>
-                    </p:spPr>
-                  </p:pic>
-                </p:oleObj>
-              </mc:Fallback>
-            </mc:AlternateContent>
-          </a:graphicData>
-        </a:graphic>
-      </p:graphicFrame>
-      <p:sp>
-        <p:nvSpPr>
-          <p:cNvPr id="5" name="Foliennummernplatzhalter 5">
-            <a:extLst>
-              <a:ext uri="{FF2B5EF4-FFF2-40B4-BE49-F238E27FC236}">
-                <a16:creationId xmlns:a16="http://schemas.microsoft.com/office/drawing/2014/main" id="{3D79B3E5-D500-4756-BF6D-C0C74895E838}"/>
-              </a:ext>
-            </a:extLst>
-          </p:cNvPr>
-          <p:cNvSpPr>
-            <a:spLocks noGrp="1"/>
-          </p:cNvSpPr>
-          <p:nvPr>
-            <p:ph type="sldNum" sz="quarter" idx="12"/>
-          </p:nvPr>
-        </p:nvSpPr>
-        <p:spPr>
-          <a:xfrm>
-            <a:off x="10766796" y="6356351"/>
-            <a:ext cx="609441" cy="365125"/>
-          </a:xfrm>
-        </p:spPr>
-        <p:txBody>
-          <a:bodyPr rtlCol="0"/>
-          <a:lstStyle/>
-          <a:p>
-            <a:pPr rtl="0"/>
-            <a:fld id="{7DC1BBB0-96F0-4077-A278-0F3FB5C104D3}" type="slidenum">
-              <a:rPr lang="de-DE"/>
-              <a:t>8</a:t>
-            </a:fld>
-            <a:endParaRPr lang="de-DE"/>
-          </a:p>
-        </p:txBody>
-      </p:sp>
       <p:pic>
         <p:nvPicPr>
           <p:cNvPr id="3" name="Grafik 2">
@@ -9737,7 +10004,7 @@
           <a:graphicData uri="http://schemas.openxmlformats.org/presentationml/2006/ole">
             <mc:AlternateContent xmlns:mc="http://schemas.openxmlformats.org/markup-compatibility/2006">
               <mc:Choice xmlns:v="urn:schemas-microsoft-com:vml" Requires="v">
-                <p:oleObj spid="_x0000_s9227" r:id="rId4" imgW="3720600" imgH="1383840" progId="">
+                <p:oleObj spid="_x0000_s9232" r:id="rId4" imgW="3720600" imgH="1383840" progId="">
                   <p:embed/>
                 </p:oleObj>
               </mc:Choice>
@@ -9778,41 +10045,6 @@
           </a:graphicData>
         </a:graphic>
       </p:graphicFrame>
-      <p:sp>
-        <p:nvSpPr>
-          <p:cNvPr id="5" name="Foliennummernplatzhalter 5">
-            <a:extLst>
-              <a:ext uri="{FF2B5EF4-FFF2-40B4-BE49-F238E27FC236}">
-                <a16:creationId xmlns:a16="http://schemas.microsoft.com/office/drawing/2014/main" id="{3D79B3E5-D500-4756-BF6D-C0C74895E838}"/>
-              </a:ext>
-            </a:extLst>
-          </p:cNvPr>
-          <p:cNvSpPr>
-            <a:spLocks noGrp="1"/>
-          </p:cNvSpPr>
-          <p:nvPr>
-            <p:ph type="sldNum" sz="quarter" idx="12"/>
-          </p:nvPr>
-        </p:nvSpPr>
-        <p:spPr>
-          <a:xfrm>
-            <a:off x="10766796" y="6356351"/>
-            <a:ext cx="609441" cy="365125"/>
-          </a:xfrm>
-        </p:spPr>
-        <p:txBody>
-          <a:bodyPr rtlCol="0"/>
-          <a:lstStyle/>
-          <a:p>
-            <a:pPr rtl="0"/>
-            <a:fld id="{7DC1BBB0-96F0-4077-A278-0F3FB5C104D3}" type="slidenum">
-              <a:rPr lang="de-DE"/>
-              <a:t>9</a:t>
-            </a:fld>
-            <a:endParaRPr lang="de-DE"/>
-          </a:p>
-        </p:txBody>
-      </p:sp>
       <p:pic>
         <p:nvPicPr>
           <p:cNvPr id="3" name="Grafik 2">

</xml_diff>